<commit_message>
bugfix: modify Module1 ppt
</commit_message>
<xml_diff>
--- a/Lecture 1/WebEducation Lecture1_jp.pptx
+++ b/Lecture 1/WebEducation Lecture1_jp.pptx
@@ -5,7 +5,7 @@
     <p:sldMasterId id="2147483648" r:id="rId1"/>
   </p:sldMasterIdLst>
   <p:notesMasterIdLst>
-    <p:notesMasterId r:id="rId60"/>
+    <p:notesMasterId r:id="rId58"/>
   </p:notesMasterIdLst>
   <p:sldIdLst>
     <p:sldId id="256" r:id="rId2"/>
@@ -46,26 +46,24 @@
     <p:sldId id="291" r:id="rId37"/>
     <p:sldId id="292" r:id="rId38"/>
     <p:sldId id="293" r:id="rId39"/>
-    <p:sldId id="294" r:id="rId40"/>
-    <p:sldId id="295" r:id="rId41"/>
-    <p:sldId id="296" r:id="rId42"/>
-    <p:sldId id="297" r:id="rId43"/>
-    <p:sldId id="298" r:id="rId44"/>
-    <p:sldId id="299" r:id="rId45"/>
-    <p:sldId id="300" r:id="rId46"/>
-    <p:sldId id="301" r:id="rId47"/>
-    <p:sldId id="302" r:id="rId48"/>
-    <p:sldId id="303" r:id="rId49"/>
-    <p:sldId id="304" r:id="rId50"/>
-    <p:sldId id="305" r:id="rId51"/>
-    <p:sldId id="306" r:id="rId52"/>
-    <p:sldId id="307" r:id="rId53"/>
-    <p:sldId id="308" r:id="rId54"/>
-    <p:sldId id="309" r:id="rId55"/>
-    <p:sldId id="310" r:id="rId56"/>
-    <p:sldId id="311" r:id="rId57"/>
-    <p:sldId id="312" r:id="rId58"/>
-    <p:sldId id="313" r:id="rId59"/>
+    <p:sldId id="296" r:id="rId40"/>
+    <p:sldId id="297" r:id="rId41"/>
+    <p:sldId id="298" r:id="rId42"/>
+    <p:sldId id="299" r:id="rId43"/>
+    <p:sldId id="300" r:id="rId44"/>
+    <p:sldId id="301" r:id="rId45"/>
+    <p:sldId id="302" r:id="rId46"/>
+    <p:sldId id="303" r:id="rId47"/>
+    <p:sldId id="304" r:id="rId48"/>
+    <p:sldId id="305" r:id="rId49"/>
+    <p:sldId id="306" r:id="rId50"/>
+    <p:sldId id="307" r:id="rId51"/>
+    <p:sldId id="308" r:id="rId52"/>
+    <p:sldId id="309" r:id="rId53"/>
+    <p:sldId id="310" r:id="rId54"/>
+    <p:sldId id="311" r:id="rId55"/>
+    <p:sldId id="312" r:id="rId56"/>
+    <p:sldId id="313" r:id="rId57"/>
   </p:sldIdLst>
   <p:sldSz cx="13004800" cy="9753600"/>
   <p:notesSz cx="6858000" cy="9144000"/>
@@ -3877,7 +3875,7 @@
           </a:ln>
           <a:extLst>
             <a:ext uri="{C572A759-6A51-4108-AA02-DFA0A04FC94B}">
-              <ma14:wrappingTextBoxFlag xmlns="" xmlns:m="http://schemas.openxmlformats.org/officeDocument/2006/math" xmlns:a14="http://schemas.microsoft.com/office/drawing/2010/main" xmlns:ma14="http://schemas.microsoft.com/office/mac/drawingml/2011/main" val="1"/>
+              <ma14:wrappingTextBoxFlag xmlns:ma14="http://schemas.microsoft.com/office/mac/drawingml/2011/main" xmlns:a14="http://schemas.microsoft.com/office/drawing/2010/main" xmlns:m="http://schemas.openxmlformats.org/officeDocument/2006/math" xmlns="" val="1"/>
             </a:ext>
           </a:extLst>
         </p:spPr>
@@ -3916,7 +3914,7 @@
           </a:ln>
           <a:extLst>
             <a:ext uri="{C572A759-6A51-4108-AA02-DFA0A04FC94B}">
-              <ma14:wrappingTextBoxFlag xmlns="" xmlns:m="http://schemas.openxmlformats.org/officeDocument/2006/math" xmlns:a14="http://schemas.microsoft.com/office/drawing/2010/main" xmlns:ma14="http://schemas.microsoft.com/office/mac/drawingml/2011/main" val="1"/>
+              <ma14:wrappingTextBoxFlag xmlns:ma14="http://schemas.microsoft.com/office/mac/drawingml/2011/main" xmlns:a14="http://schemas.microsoft.com/office/drawing/2010/main" xmlns:m="http://schemas.openxmlformats.org/officeDocument/2006/math" xmlns="" val="1"/>
             </a:ext>
           </a:extLst>
         </p:spPr>
@@ -4927,7 +4925,7 @@
                 <a:latin typeface="Meiryo UI" panose="020B0604030504040204" pitchFamily="50" charset="-128"/>
                 <a:ea typeface="Meiryo UI" panose="020B0604030504040204" pitchFamily="50" charset="-128"/>
               </a:rPr>
-              <a:t>真似する</a:t>
+              <a:t>真似すること</a:t>
             </a:r>
             <a:endParaRPr sz="7200" dirty="0">
               <a:latin typeface="Meiryo UI" panose="020B0604030504040204" pitchFamily="50" charset="-128"/>
@@ -4963,7 +4961,7 @@
           </a:ln>
           <a:extLst>
             <a:ext uri="{C572A759-6A51-4108-AA02-DFA0A04FC94B}">
-              <ma14:wrappingTextBoxFlag xmlns="" xmlns:m="http://schemas.openxmlformats.org/officeDocument/2006/math" xmlns:a14="http://schemas.microsoft.com/office/drawing/2010/main" xmlns:ma14="http://schemas.microsoft.com/office/mac/drawingml/2011/main" val="1"/>
+              <ma14:wrappingTextBoxFlag xmlns:ma14="http://schemas.microsoft.com/office/mac/drawingml/2011/main" xmlns:a14="http://schemas.microsoft.com/office/drawing/2010/main" xmlns:m="http://schemas.openxmlformats.org/officeDocument/2006/math" xmlns="" val="1"/>
             </a:ext>
           </a:extLst>
         </p:spPr>
@@ -5226,11 +5224,18 @@
           <a:p>
             <a:pPr hangingPunct="1"/>
             <a:r>
+              <a:rPr lang="en-US" altLang="ja-JP" dirty="0">
+                <a:latin typeface="Meiryo UI" panose="020B0604030504040204" pitchFamily="50" charset="-128"/>
+                <a:ea typeface="Meiryo UI" panose="020B0604030504040204" pitchFamily="50" charset="-128"/>
+              </a:rPr>
+              <a:t>Web</a:t>
+            </a:r>
+            <a:r>
               <a:rPr lang="ja-JP" altLang="en-US" dirty="0">
                 <a:latin typeface="Meiryo UI" panose="020B0604030504040204" pitchFamily="50" charset="-128"/>
                 <a:ea typeface="Meiryo UI" panose="020B0604030504040204" pitchFamily="50" charset="-128"/>
               </a:rPr>
-              <a:t>プログラミングをする上で大切なこと</a:t>
+              <a:t>開発で大切なこと</a:t>
             </a:r>
             <a:endParaRPr lang="zh-TW" altLang="en-US" dirty="0">
               <a:latin typeface="Meiryo UI" panose="020B0604030504040204" pitchFamily="50" charset="-128"/>
@@ -5418,7 +5423,7 @@
           </a:ln>
           <a:extLst>
             <a:ext uri="{C572A759-6A51-4108-AA02-DFA0A04FC94B}">
-              <ma14:wrappingTextBoxFlag xmlns="" xmlns:m="http://schemas.openxmlformats.org/officeDocument/2006/math" xmlns:a14="http://schemas.microsoft.com/office/drawing/2010/main" xmlns:ma14="http://schemas.microsoft.com/office/mac/drawingml/2011/main" val="1"/>
+              <ma14:wrappingTextBoxFlag xmlns:ma14="http://schemas.microsoft.com/office/mac/drawingml/2011/main" xmlns:a14="http://schemas.microsoft.com/office/drawing/2010/main" xmlns:m="http://schemas.openxmlformats.org/officeDocument/2006/math" xmlns="" val="1"/>
             </a:ext>
           </a:extLst>
         </p:spPr>
@@ -5461,7 +5466,7 @@
           </a:ln>
           <a:extLst>
             <a:ext uri="{C572A759-6A51-4108-AA02-DFA0A04FC94B}">
-              <ma14:wrappingTextBoxFlag xmlns="" xmlns:m="http://schemas.openxmlformats.org/officeDocument/2006/math" xmlns:a14="http://schemas.microsoft.com/office/drawing/2010/main" xmlns:ma14="http://schemas.microsoft.com/office/mac/drawingml/2011/main" val="1"/>
+              <ma14:wrappingTextBoxFlag xmlns:ma14="http://schemas.microsoft.com/office/mac/drawingml/2011/main" xmlns:a14="http://schemas.microsoft.com/office/drawing/2010/main" xmlns:m="http://schemas.openxmlformats.org/officeDocument/2006/math" xmlns="" val="1"/>
             </a:ext>
           </a:extLst>
         </p:spPr>
@@ -5504,7 +5509,7 @@
           </a:ln>
           <a:extLst>
             <a:ext uri="{C572A759-6A51-4108-AA02-DFA0A04FC94B}">
-              <ma14:wrappingTextBoxFlag xmlns="" xmlns:m="http://schemas.openxmlformats.org/officeDocument/2006/math" xmlns:a14="http://schemas.microsoft.com/office/drawing/2010/main" xmlns:ma14="http://schemas.microsoft.com/office/mac/drawingml/2011/main" val="1"/>
+              <ma14:wrappingTextBoxFlag xmlns:ma14="http://schemas.microsoft.com/office/mac/drawingml/2011/main" xmlns:a14="http://schemas.microsoft.com/office/drawing/2010/main" xmlns:m="http://schemas.openxmlformats.org/officeDocument/2006/math" xmlns="" val="1"/>
             </a:ext>
           </a:extLst>
         </p:spPr>
@@ -5718,7 +5723,7 @@
           </a:ln>
           <a:extLst>
             <a:ext uri="{C572A759-6A51-4108-AA02-DFA0A04FC94B}">
-              <ma14:wrappingTextBoxFlag xmlns="" xmlns:m="http://schemas.openxmlformats.org/officeDocument/2006/math" xmlns:a14="http://schemas.microsoft.com/office/drawing/2010/main" xmlns:ma14="http://schemas.microsoft.com/office/mac/drawingml/2011/main" val="1"/>
+              <ma14:wrappingTextBoxFlag xmlns:ma14="http://schemas.microsoft.com/office/mac/drawingml/2011/main" xmlns:a14="http://schemas.microsoft.com/office/drawing/2010/main" xmlns:m="http://schemas.openxmlformats.org/officeDocument/2006/math" xmlns="" val="1"/>
             </a:ext>
           </a:extLst>
         </p:spPr>
@@ -5850,7 +5855,7 @@
                 <a:latin typeface="Meiryo UI" panose="020B0604030504040204" pitchFamily="50" charset="-128"/>
                 <a:ea typeface="Meiryo UI" panose="020B0604030504040204" pitchFamily="50" charset="-128"/>
               </a:rPr>
-              <a:t>観察する</a:t>
+              <a:t>観察すること</a:t>
             </a:r>
             <a:endParaRPr sz="7200" dirty="0">
               <a:latin typeface="Meiryo UI" panose="020B0604030504040204" pitchFamily="50" charset="-128"/>
@@ -5886,7 +5891,7 @@
           </a:ln>
           <a:extLst>
             <a:ext uri="{C572A759-6A51-4108-AA02-DFA0A04FC94B}">
-              <ma14:wrappingTextBoxFlag xmlns="" xmlns:m="http://schemas.openxmlformats.org/officeDocument/2006/math" xmlns:a14="http://schemas.microsoft.com/office/drawing/2010/main" xmlns:ma14="http://schemas.microsoft.com/office/mac/drawingml/2011/main" val="1"/>
+              <ma14:wrappingTextBoxFlag xmlns:ma14="http://schemas.microsoft.com/office/mac/drawingml/2011/main" xmlns:a14="http://schemas.microsoft.com/office/drawing/2010/main" xmlns:m="http://schemas.openxmlformats.org/officeDocument/2006/math" xmlns="" val="1"/>
             </a:ext>
           </a:extLst>
         </p:spPr>
@@ -6149,11 +6154,18 @@
           <a:p>
             <a:pPr hangingPunct="1"/>
             <a:r>
+              <a:rPr lang="en-US" altLang="ja-JP" dirty="0">
+                <a:latin typeface="Meiryo UI" panose="020B0604030504040204" pitchFamily="50" charset="-128"/>
+                <a:ea typeface="Meiryo UI" panose="020B0604030504040204" pitchFamily="50" charset="-128"/>
+              </a:rPr>
+              <a:t>Web</a:t>
+            </a:r>
+            <a:r>
               <a:rPr lang="ja-JP" altLang="en-US" dirty="0">
                 <a:latin typeface="Meiryo UI" panose="020B0604030504040204" pitchFamily="50" charset="-128"/>
                 <a:ea typeface="Meiryo UI" panose="020B0604030504040204" pitchFamily="50" charset="-128"/>
               </a:rPr>
-              <a:t>プログラミングをする上で大切なこと</a:t>
+              <a:t>開発で大切なこと</a:t>
             </a:r>
             <a:endParaRPr lang="zh-TW" altLang="en-US" dirty="0">
               <a:latin typeface="Meiryo UI" panose="020B0604030504040204" pitchFamily="50" charset="-128"/>
@@ -6440,7 +6452,7 @@
           </a:ln>
           <a:extLst>
             <a:ext uri="{C572A759-6A51-4108-AA02-DFA0A04FC94B}">
-              <ma14:wrappingTextBoxFlag xmlns="" xmlns:m="http://schemas.openxmlformats.org/officeDocument/2006/math" xmlns:a14="http://schemas.microsoft.com/office/drawing/2010/main" xmlns:ma14="http://schemas.microsoft.com/office/mac/drawingml/2011/main" val="1"/>
+              <ma14:wrappingTextBoxFlag xmlns:ma14="http://schemas.microsoft.com/office/mac/drawingml/2011/main" xmlns:a14="http://schemas.microsoft.com/office/drawing/2010/main" xmlns:m="http://schemas.openxmlformats.org/officeDocument/2006/math" xmlns="" val="1"/>
             </a:ext>
           </a:extLst>
         </p:spPr>
@@ -6707,7 +6719,7 @@
                 <a:latin typeface="Meiryo UI" panose="020B0604030504040204" pitchFamily="50" charset="-128"/>
                 <a:ea typeface="Meiryo UI" panose="020B0604030504040204" pitchFamily="50" charset="-128"/>
               </a:rPr>
-              <a:t>皆に学んでほしい一つのポイント</a:t>
+              <a:t>皆に学んでほしいポイント！</a:t>
             </a:r>
             <a:endParaRPr lang="zh-TW" altLang="en-US" dirty="0">
               <a:latin typeface="Meiryo UI" panose="020B0604030504040204" pitchFamily="50" charset="-128"/>
@@ -6926,7 +6938,7 @@
           </a:ln>
           <a:extLst>
             <a:ext uri="{C572A759-6A51-4108-AA02-DFA0A04FC94B}">
-              <ma14:wrappingTextBoxFlag xmlns="" xmlns:m="http://schemas.openxmlformats.org/officeDocument/2006/math" xmlns:a14="http://schemas.microsoft.com/office/drawing/2010/main" xmlns:ma14="http://schemas.microsoft.com/office/mac/drawingml/2011/main" val="1"/>
+              <ma14:wrappingTextBoxFlag xmlns:ma14="http://schemas.microsoft.com/office/mac/drawingml/2011/main" xmlns:a14="http://schemas.microsoft.com/office/drawing/2010/main" xmlns:m="http://schemas.openxmlformats.org/officeDocument/2006/math" xmlns="" val="1"/>
             </a:ext>
           </a:extLst>
         </p:spPr>
@@ -7287,8 +7299,12 @@
           <a:lstStyle/>
           <a:p>
             <a:r>
+              <a:rPr lang="en-US" altLang="ja-JP" dirty="0"/>
+              <a:t>WEB</a:t>
+            </a:r>
+            <a:r>
               <a:rPr lang="ja-JP" altLang="en-US" dirty="0"/>
-              <a:t>プログラミングをする上で大切なこと</a:t>
+              <a:t>開発で大切なこと</a:t>
             </a:r>
             <a:endParaRPr lang="zh-TW" altLang="en-US" dirty="0"/>
           </a:p>
@@ -7530,7 +7546,7 @@
           </a:ln>
           <a:extLst>
             <a:ext uri="{C572A759-6A51-4108-AA02-DFA0A04FC94B}">
-              <ma14:wrappingTextBoxFlag xmlns="" xmlns:m="http://schemas.openxmlformats.org/officeDocument/2006/math" xmlns:a14="http://schemas.microsoft.com/office/drawing/2010/main" xmlns:ma14="http://schemas.microsoft.com/office/mac/drawingml/2011/main" val="1"/>
+              <ma14:wrappingTextBoxFlag xmlns:ma14="http://schemas.microsoft.com/office/mac/drawingml/2011/main" xmlns:a14="http://schemas.microsoft.com/office/drawing/2010/main" xmlns:m="http://schemas.openxmlformats.org/officeDocument/2006/math" xmlns="" val="1"/>
             </a:ext>
           </a:extLst>
         </p:spPr>
@@ -7799,7 +7815,7 @@
           </a:ln>
           <a:extLst>
             <a:ext uri="{C572A759-6A51-4108-AA02-DFA0A04FC94B}">
-              <ma14:wrappingTextBoxFlag xmlns="" xmlns:m="http://schemas.openxmlformats.org/officeDocument/2006/math" xmlns:a14="http://schemas.microsoft.com/office/drawing/2010/main" xmlns:ma14="http://schemas.microsoft.com/office/mac/drawingml/2011/main" val="1"/>
+              <ma14:wrappingTextBoxFlag xmlns:ma14="http://schemas.microsoft.com/office/mac/drawingml/2011/main" xmlns:a14="http://schemas.microsoft.com/office/drawing/2010/main" xmlns:m="http://schemas.openxmlformats.org/officeDocument/2006/math" xmlns="" val="1"/>
             </a:ext>
           </a:extLst>
         </p:spPr>
@@ -9101,7 +9117,7 @@
           </a:ln>
           <a:extLst>
             <a:ext uri="{C572A759-6A51-4108-AA02-DFA0A04FC94B}">
-              <ma14:wrappingTextBoxFlag xmlns="" xmlns:m="http://schemas.openxmlformats.org/officeDocument/2006/math" xmlns:a14="http://schemas.microsoft.com/office/drawing/2010/main" xmlns:ma14="http://schemas.microsoft.com/office/mac/drawingml/2011/main" val="1"/>
+              <ma14:wrappingTextBoxFlag xmlns:ma14="http://schemas.microsoft.com/office/mac/drawingml/2011/main" xmlns:a14="http://schemas.microsoft.com/office/drawing/2010/main" xmlns:m="http://schemas.openxmlformats.org/officeDocument/2006/math" xmlns="" val="1"/>
             </a:ext>
           </a:extLst>
         </p:spPr>
@@ -9460,11 +9476,18 @@
           <a:lstStyle/>
           <a:p>
             <a:r>
+              <a:rPr lang="en-US" altLang="ja-JP" dirty="0">
+                <a:latin typeface="Meiryo UI" panose="020B0604030504040204" pitchFamily="50" charset="-128"/>
+                <a:ea typeface="Meiryo UI" panose="020B0604030504040204" pitchFamily="50" charset="-128"/>
+              </a:rPr>
+              <a:t>Web</a:t>
+            </a:r>
+            <a:r>
               <a:rPr lang="ja-JP" altLang="en-US" dirty="0">
                 <a:latin typeface="Meiryo UI" panose="020B0604030504040204" pitchFamily="50" charset="-128"/>
                 <a:ea typeface="Meiryo UI" panose="020B0604030504040204" pitchFamily="50" charset="-128"/>
               </a:rPr>
-              <a:t>プログラミングをする上で大切なこと</a:t>
+              <a:t>開発で大切なこと</a:t>
             </a:r>
             <a:endParaRPr lang="zh-TW" altLang="en-US" dirty="0">
               <a:latin typeface="Meiryo UI" panose="020B0604030504040204" pitchFamily="50" charset="-128"/>
@@ -10940,7 +10963,7 @@
           </a:ln>
           <a:extLst>
             <a:ext uri="{C572A759-6A51-4108-AA02-DFA0A04FC94B}">
-              <ma14:wrappingTextBoxFlag xmlns="" xmlns:m="http://schemas.openxmlformats.org/officeDocument/2006/math" xmlns:a14="http://schemas.microsoft.com/office/drawing/2010/main" xmlns:ma14="http://schemas.microsoft.com/office/mac/drawingml/2011/main" val="1"/>
+              <ma14:wrappingTextBoxFlag xmlns:ma14="http://schemas.microsoft.com/office/mac/drawingml/2011/main" xmlns:a14="http://schemas.microsoft.com/office/drawing/2010/main" xmlns:m="http://schemas.openxmlformats.org/officeDocument/2006/math" xmlns="" val="1"/>
             </a:ext>
           </a:extLst>
         </p:spPr>
@@ -11163,14 +11186,14 @@
               <a:defRPr sz="7990"/>
             </a:pPr>
             <a:r>
-              <a:rPr lang="en-US" dirty="0" err="1">
+              <a:rPr lang="en-US" dirty="0">
                 <a:latin typeface="Meiryo UI" panose="020B0604030504040204" pitchFamily="50" charset="-128"/>
                 <a:ea typeface="Meiryo UI" panose="020B0604030504040204" pitchFamily="50" charset="-128"/>
               </a:rPr>
               <a:t>C</a:t>
             </a:r>
             <a:r>
-              <a:rPr dirty="0" err="1">
+              <a:rPr dirty="0">
                 <a:latin typeface="Meiryo UI" panose="020B0604030504040204" pitchFamily="50" charset="-128"/>
                 <a:ea typeface="Meiryo UI" panose="020B0604030504040204" pitchFamily="50" charset="-128"/>
               </a:rPr>
@@ -11575,7 +11598,7 @@
           </a:ln>
           <a:extLst>
             <a:ext uri="{C572A759-6A51-4108-AA02-DFA0A04FC94B}">
-              <ma14:wrappingTextBoxFlag xmlns="" xmlns:m="http://schemas.openxmlformats.org/officeDocument/2006/math" xmlns:a14="http://schemas.microsoft.com/office/drawing/2010/main" xmlns:ma14="http://schemas.microsoft.com/office/mac/drawingml/2011/main" val="1"/>
+              <ma14:wrappingTextBoxFlag xmlns:ma14="http://schemas.microsoft.com/office/mac/drawingml/2011/main" xmlns:a14="http://schemas.microsoft.com/office/drawing/2010/main" xmlns:m="http://schemas.openxmlformats.org/officeDocument/2006/math" xmlns="" val="1"/>
             </a:ext>
           </a:extLst>
         </p:spPr>
@@ -11970,866 +11993,6 @@
 </file>
 
 <file path=ppt/slides/slide39.xml><?xml version="1.0" encoding="utf-8"?>
-<p:sld xmlns:a="http://schemas.openxmlformats.org/drawingml/2006/main" xmlns:r="http://schemas.openxmlformats.org/officeDocument/2006/relationships" xmlns:p="http://schemas.openxmlformats.org/presentationml/2006/main">
-  <p:cSld>
-    <p:spTree>
-      <p:nvGrpSpPr>
-        <p:cNvPr id="1" name=""/>
-        <p:cNvGrpSpPr/>
-        <p:nvPr/>
-      </p:nvGrpSpPr>
-      <p:grpSpPr>
-        <a:xfrm>
-          <a:off x="0" y="0"/>
-          <a:ext cx="0" cy="0"/>
-          <a:chOff x="0" y="0"/>
-          <a:chExt cx="0" cy="0"/>
-        </a:xfrm>
-      </p:grpSpPr>
-      <p:sp>
-        <p:nvSpPr>
-          <p:cNvPr id="346" name="HTML與css的有什麼關連？…"/>
-          <p:cNvSpPr txBox="1">
-            <a:spLocks noGrp="1"/>
-          </p:cNvSpPr>
-          <p:nvPr>
-            <p:ph type="ctrTitle"/>
-          </p:nvPr>
-        </p:nvSpPr>
-        <p:spPr>
-          <a:prstGeom prst="rect">
-            <a:avLst/>
-          </a:prstGeom>
-        </p:spPr>
-        <p:txBody>
-          <a:bodyPr/>
-          <a:lstStyle/>
-          <a:p>
-            <a:pPr algn="ctr" defTabSz="245363">
-              <a:defRPr sz="7140"/>
-            </a:pPr>
-            <a:r>
-              <a:rPr dirty="0">
-                <a:latin typeface="Meiryo UI" panose="020B0604030504040204" pitchFamily="50" charset="-128"/>
-                <a:ea typeface="Meiryo UI" panose="020B0604030504040204" pitchFamily="50" charset="-128"/>
-              </a:rPr>
-              <a:t>HTML</a:t>
-            </a:r>
-            <a:r>
-              <a:rPr lang="ja-JP" altLang="en-US" dirty="0">
-                <a:latin typeface="Meiryo UI" panose="020B0604030504040204" pitchFamily="50" charset="-128"/>
-                <a:ea typeface="Meiryo UI" panose="020B0604030504040204" pitchFamily="50" charset="-128"/>
-              </a:rPr>
-              <a:t>と</a:t>
-            </a:r>
-            <a:r>
-              <a:rPr dirty="0" err="1">
-                <a:latin typeface="Meiryo UI" panose="020B0604030504040204" pitchFamily="50" charset="-128"/>
-                <a:ea typeface="Meiryo UI" panose="020B0604030504040204" pitchFamily="50" charset="-128"/>
-              </a:rPr>
-              <a:t>css</a:t>
-            </a:r>
-            <a:r>
-              <a:rPr lang="ja-JP" altLang="en-US" dirty="0">
-                <a:latin typeface="Meiryo UI" panose="020B0604030504040204" pitchFamily="50" charset="-128"/>
-                <a:ea typeface="Meiryo UI" panose="020B0604030504040204" pitchFamily="50" charset="-128"/>
-              </a:rPr>
-              <a:t>の関連は</a:t>
-            </a:r>
-            <a:r>
-              <a:rPr dirty="0">
-                <a:latin typeface="Meiryo UI" panose="020B0604030504040204" pitchFamily="50" charset="-128"/>
-                <a:ea typeface="Meiryo UI" panose="020B0604030504040204" pitchFamily="50" charset="-128"/>
-              </a:rPr>
-              <a:t>？</a:t>
-            </a:r>
-          </a:p>
-          <a:p>
-            <a:pPr algn="ctr" defTabSz="245363">
-              <a:defRPr sz="2940"/>
-            </a:pPr>
-            <a:r>
-              <a:rPr dirty="0">
-                <a:latin typeface="Meiryo UI" panose="020B0604030504040204" pitchFamily="50" charset="-128"/>
-                <a:ea typeface="Meiryo UI" panose="020B0604030504040204" pitchFamily="50" charset="-128"/>
-              </a:rPr>
-              <a:t>（</a:t>
-            </a:r>
-            <a:r>
-              <a:rPr lang="ja-JP" altLang="en-US" dirty="0">
-                <a:latin typeface="Meiryo UI" panose="020B0604030504040204" pitchFamily="50" charset="-128"/>
-                <a:ea typeface="Meiryo UI" panose="020B0604030504040204" pitchFamily="50" charset="-128"/>
-              </a:rPr>
-              <a:t>お互い影響しそうな部分</a:t>
-            </a:r>
-            <a:r>
-              <a:rPr dirty="0">
-                <a:latin typeface="Meiryo UI" panose="020B0604030504040204" pitchFamily="50" charset="-128"/>
-                <a:ea typeface="Meiryo UI" panose="020B0604030504040204" pitchFamily="50" charset="-128"/>
-              </a:rPr>
-              <a:t>）</a:t>
-            </a:r>
-          </a:p>
-        </p:txBody>
-      </p:sp>
-      <p:sp>
-        <p:nvSpPr>
-          <p:cNvPr id="347" name="作業一"/>
-          <p:cNvSpPr txBox="1">
-            <a:spLocks noGrp="1"/>
-          </p:cNvSpPr>
-          <p:nvPr>
-            <p:ph type="subTitle" sz="quarter" idx="1"/>
-          </p:nvPr>
-        </p:nvSpPr>
-        <p:spPr>
-          <a:prstGeom prst="rect">
-            <a:avLst/>
-          </a:prstGeom>
-        </p:spPr>
-        <p:txBody>
-          <a:bodyPr/>
-          <a:lstStyle/>
-          <a:p>
-            <a:r>
-              <a:rPr lang="ja-JP" altLang="en-US" dirty="0"/>
-              <a:t>宿題 </a:t>
-            </a:r>
-            <a:r>
-              <a:rPr lang="en-US" altLang="ja-JP" dirty="0"/>
-              <a:t>I</a:t>
-            </a:r>
-            <a:endParaRPr dirty="0"/>
-          </a:p>
-        </p:txBody>
-      </p:sp>
-    </p:spTree>
-  </p:cSld>
-  <p:clrMapOvr>
-    <a:masterClrMapping/>
-  </p:clrMapOvr>
-  <p:transition spd="med"/>
-</p:sld>
-</file>
-
-<file path=ppt/slides/slide4.xml><?xml version="1.0" encoding="utf-8"?>
-<p:sld xmlns:a="http://schemas.openxmlformats.org/drawingml/2006/main" xmlns:r="http://schemas.openxmlformats.org/officeDocument/2006/relationships" xmlns:p="http://schemas.openxmlformats.org/presentationml/2006/main">
-  <p:cSld>
-    <p:spTree>
-      <p:nvGrpSpPr>
-        <p:cNvPr id="1" name=""/>
-        <p:cNvGrpSpPr/>
-        <p:nvPr/>
-      </p:nvGrpSpPr>
-      <p:grpSpPr>
-        <a:xfrm>
-          <a:off x="0" y="0"/>
-          <a:ext cx="0" cy="0"/>
-          <a:chOff x="0" y="0"/>
-          <a:chExt cx="0" cy="0"/>
-        </a:xfrm>
-      </p:grpSpPr>
-      <p:sp>
-        <p:nvSpPr>
-          <p:cNvPr id="175" name="程式邏輯"/>
-          <p:cNvSpPr txBox="1">
-            <a:spLocks noGrp="1"/>
-          </p:cNvSpPr>
-          <p:nvPr>
-            <p:ph type="ctrTitle"/>
-          </p:nvPr>
-        </p:nvSpPr>
-        <p:spPr>
-          <a:prstGeom prst="rect">
-            <a:avLst/>
-          </a:prstGeom>
-        </p:spPr>
-        <p:txBody>
-          <a:bodyPr>
-            <a:noAutofit/>
-          </a:bodyPr>
-          <a:lstStyle>
-            <a:lvl1pPr algn="ctr" defTabSz="502412">
-              <a:defRPr sz="14620"/>
-            </a:lvl1pPr>
-          </a:lstStyle>
-          <a:p>
-            <a:pPr algn="r"/>
-            <a:r>
-              <a:rPr lang="ja-JP" altLang="en-US" sz="7200" dirty="0">
-                <a:latin typeface="Meiryo UI" panose="020B0604030504040204" pitchFamily="50" charset="-128"/>
-                <a:ea typeface="Meiryo UI" panose="020B0604030504040204" pitchFamily="50" charset="-128"/>
-              </a:rPr>
-              <a:t>プログラムのロジック</a:t>
-            </a:r>
-            <a:endParaRPr sz="7200" dirty="0">
-              <a:latin typeface="Meiryo UI" panose="020B0604030504040204" pitchFamily="50" charset="-128"/>
-              <a:ea typeface="Meiryo UI" panose="020B0604030504040204" pitchFamily="50" charset="-128"/>
-            </a:endParaRPr>
-          </a:p>
-        </p:txBody>
-      </p:sp>
-      <p:sp>
-        <p:nvSpPr>
-          <p:cNvPr id="7" name="寫程式最重要的是什麼？">
-            <a:extLst>
-              <a:ext uri="{FF2B5EF4-FFF2-40B4-BE49-F238E27FC236}">
-                <a16:creationId xmlns:a16="http://schemas.microsoft.com/office/drawing/2014/main" id="{9E06758C-818C-4A51-80DF-F4E6FBE6321C}"/>
-              </a:ext>
-            </a:extLst>
-          </p:cNvPr>
-          <p:cNvSpPr txBox="1">
-            <a:spLocks/>
-          </p:cNvSpPr>
-          <p:nvPr/>
-        </p:nvSpPr>
-        <p:spPr>
-          <a:xfrm>
-            <a:off x="406400" y="4267200"/>
-            <a:ext cx="12192000" cy="1803400"/>
-          </a:xfrm>
-          <a:prstGeom prst="rect">
-            <a:avLst/>
-          </a:prstGeom>
-          <a:ln w="12700">
-            <a:miter lim="400000"/>
-          </a:ln>
-          <a:extLst>
-            <a:ext uri="{C572A759-6A51-4108-AA02-DFA0A04FC94B}">
-              <ma14:wrappingTextBoxFlag xmlns="" xmlns:m="http://schemas.openxmlformats.org/officeDocument/2006/math" xmlns:a14="http://schemas.microsoft.com/office/drawing/2010/main" xmlns:ma14="http://schemas.microsoft.com/office/mac/drawingml/2011/main" val="1"/>
-            </a:ext>
-          </a:extLst>
-        </p:spPr>
-        <p:txBody>
-          <a:bodyPr lIns="50800" tIns="50800" rIns="50800" bIns="50800" anchor="b">
-            <a:normAutofit/>
-          </a:bodyPr>
-          <a:lstStyle>
-            <a:lvl1pPr marL="0" marR="0" indent="0" algn="l" defTabSz="584200" rtl="0" latinLnBrk="0">
-              <a:lnSpc>
-                <a:spcPct val="80000"/>
-              </a:lnSpc>
-              <a:spcBef>
-                <a:spcPts val="2300"/>
-              </a:spcBef>
-              <a:spcAft>
-                <a:spcPts val="0"/>
-              </a:spcAft>
-              <a:buClrTx/>
-              <a:buSzTx/>
-              <a:buFontTx/>
-              <a:buNone/>
-              <a:tabLst/>
-              <a:defRPr sz="5400" b="0" i="0" u="none" strike="noStrike" cap="all" spc="0" baseline="0">
-                <a:solidFill>
-                  <a:srgbClr val="A6AAA9"/>
-                </a:solidFill>
-                <a:uFillTx/>
-                <a:latin typeface="+mn-lt"/>
-                <a:ea typeface="+mn-ea"/>
-                <a:cs typeface="+mn-cs"/>
-                <a:sym typeface="Baskerville"/>
-              </a:defRPr>
-            </a:lvl1pPr>
-            <a:lvl2pPr marL="0" marR="0" indent="0" algn="l" defTabSz="584200" rtl="0" latinLnBrk="0">
-              <a:lnSpc>
-                <a:spcPct val="80000"/>
-              </a:lnSpc>
-              <a:spcBef>
-                <a:spcPts val="2300"/>
-              </a:spcBef>
-              <a:spcAft>
-                <a:spcPts val="0"/>
-              </a:spcAft>
-              <a:buClrTx/>
-              <a:buSzTx/>
-              <a:buFontTx/>
-              <a:buNone/>
-              <a:tabLst/>
-              <a:defRPr sz="5400" b="0" i="0" u="none" strike="noStrike" cap="all" spc="0" baseline="0">
-                <a:solidFill>
-                  <a:srgbClr val="A6AAA9"/>
-                </a:solidFill>
-                <a:uFillTx/>
-                <a:latin typeface="+mn-lt"/>
-                <a:ea typeface="+mn-ea"/>
-                <a:cs typeface="+mn-cs"/>
-                <a:sym typeface="Baskerville"/>
-              </a:defRPr>
-            </a:lvl2pPr>
-            <a:lvl3pPr marL="0" marR="0" indent="0" algn="l" defTabSz="584200" rtl="0" latinLnBrk="0">
-              <a:lnSpc>
-                <a:spcPct val="80000"/>
-              </a:lnSpc>
-              <a:spcBef>
-                <a:spcPts val="2300"/>
-              </a:spcBef>
-              <a:spcAft>
-                <a:spcPts val="0"/>
-              </a:spcAft>
-              <a:buClrTx/>
-              <a:buSzTx/>
-              <a:buFontTx/>
-              <a:buNone/>
-              <a:tabLst/>
-              <a:defRPr sz="5400" b="0" i="0" u="none" strike="noStrike" cap="all" spc="0" baseline="0">
-                <a:solidFill>
-                  <a:srgbClr val="A6AAA9"/>
-                </a:solidFill>
-                <a:uFillTx/>
-                <a:latin typeface="+mn-lt"/>
-                <a:ea typeface="+mn-ea"/>
-                <a:cs typeface="+mn-cs"/>
-                <a:sym typeface="Baskerville"/>
-              </a:defRPr>
-            </a:lvl3pPr>
-            <a:lvl4pPr marL="0" marR="0" indent="0" algn="l" defTabSz="584200" rtl="0" latinLnBrk="0">
-              <a:lnSpc>
-                <a:spcPct val="80000"/>
-              </a:lnSpc>
-              <a:spcBef>
-                <a:spcPts val="2300"/>
-              </a:spcBef>
-              <a:spcAft>
-                <a:spcPts val="0"/>
-              </a:spcAft>
-              <a:buClrTx/>
-              <a:buSzTx/>
-              <a:buFontTx/>
-              <a:buNone/>
-              <a:tabLst/>
-              <a:defRPr sz="5400" b="0" i="0" u="none" strike="noStrike" cap="all" spc="0" baseline="0">
-                <a:solidFill>
-                  <a:srgbClr val="A6AAA9"/>
-                </a:solidFill>
-                <a:uFillTx/>
-                <a:latin typeface="+mn-lt"/>
-                <a:ea typeface="+mn-ea"/>
-                <a:cs typeface="+mn-cs"/>
-                <a:sym typeface="Baskerville"/>
-              </a:defRPr>
-            </a:lvl4pPr>
-            <a:lvl5pPr marL="0" marR="0" indent="0" algn="l" defTabSz="584200" rtl="0" latinLnBrk="0">
-              <a:lnSpc>
-                <a:spcPct val="80000"/>
-              </a:lnSpc>
-              <a:spcBef>
-                <a:spcPts val="2300"/>
-              </a:spcBef>
-              <a:spcAft>
-                <a:spcPts val="0"/>
-              </a:spcAft>
-              <a:buClrTx/>
-              <a:buSzTx/>
-              <a:buFontTx/>
-              <a:buNone/>
-              <a:tabLst/>
-              <a:defRPr sz="5400" b="0" i="0" u="none" strike="noStrike" cap="all" spc="0" baseline="0">
-                <a:solidFill>
-                  <a:srgbClr val="A6AAA9"/>
-                </a:solidFill>
-                <a:uFillTx/>
-                <a:latin typeface="+mn-lt"/>
-                <a:ea typeface="+mn-ea"/>
-                <a:cs typeface="+mn-cs"/>
-                <a:sym typeface="Baskerville"/>
-              </a:defRPr>
-            </a:lvl5pPr>
-            <a:lvl6pPr marL="2667000" marR="0" indent="-444500" algn="l" defTabSz="584200" rtl="0" latinLnBrk="0">
-              <a:lnSpc>
-                <a:spcPct val="100000"/>
-              </a:lnSpc>
-              <a:spcBef>
-                <a:spcPts val="2800"/>
-              </a:spcBef>
-              <a:spcAft>
-                <a:spcPts val="0"/>
-              </a:spcAft>
-              <a:buClr>
-                <a:schemeClr val="accent1">
-                  <a:satOff val="-4060"/>
-                </a:schemeClr>
-              </a:buClr>
-              <a:buSzPct val="104999"/>
-              <a:buFont typeface="Avenir Next"/>
-              <a:buChar char="‣"/>
-              <a:tabLst/>
-              <a:defRPr sz="3400" b="0" i="0" u="none" strike="noStrike" cap="none" spc="0" baseline="0">
-                <a:solidFill>
-                  <a:srgbClr val="838787"/>
-                </a:solidFill>
-                <a:uFillTx/>
-                <a:latin typeface="Avenir Next Medium"/>
-                <a:ea typeface="Avenir Next Medium"/>
-                <a:cs typeface="Avenir Next Medium"/>
-                <a:sym typeface="Avenir Next Medium"/>
-              </a:defRPr>
-            </a:lvl6pPr>
-            <a:lvl7pPr marL="3111500" marR="0" indent="-444500" algn="l" defTabSz="584200" rtl="0" latinLnBrk="0">
-              <a:lnSpc>
-                <a:spcPct val="100000"/>
-              </a:lnSpc>
-              <a:spcBef>
-                <a:spcPts val="2800"/>
-              </a:spcBef>
-              <a:spcAft>
-                <a:spcPts val="0"/>
-              </a:spcAft>
-              <a:buClr>
-                <a:schemeClr val="accent1">
-                  <a:satOff val="-4060"/>
-                </a:schemeClr>
-              </a:buClr>
-              <a:buSzPct val="104999"/>
-              <a:buFont typeface="Avenir Next"/>
-              <a:buChar char="‣"/>
-              <a:tabLst/>
-              <a:defRPr sz="3400" b="0" i="0" u="none" strike="noStrike" cap="none" spc="0" baseline="0">
-                <a:solidFill>
-                  <a:srgbClr val="838787"/>
-                </a:solidFill>
-                <a:uFillTx/>
-                <a:latin typeface="Avenir Next Medium"/>
-                <a:ea typeface="Avenir Next Medium"/>
-                <a:cs typeface="Avenir Next Medium"/>
-                <a:sym typeface="Avenir Next Medium"/>
-              </a:defRPr>
-            </a:lvl7pPr>
-            <a:lvl8pPr marL="3556000" marR="0" indent="-444500" algn="l" defTabSz="584200" rtl="0" latinLnBrk="0">
-              <a:lnSpc>
-                <a:spcPct val="100000"/>
-              </a:lnSpc>
-              <a:spcBef>
-                <a:spcPts val="2800"/>
-              </a:spcBef>
-              <a:spcAft>
-                <a:spcPts val="0"/>
-              </a:spcAft>
-              <a:buClr>
-                <a:schemeClr val="accent1">
-                  <a:satOff val="-4060"/>
-                </a:schemeClr>
-              </a:buClr>
-              <a:buSzPct val="104999"/>
-              <a:buFont typeface="Avenir Next"/>
-              <a:buChar char="‣"/>
-              <a:tabLst/>
-              <a:defRPr sz="3400" b="0" i="0" u="none" strike="noStrike" cap="none" spc="0" baseline="0">
-                <a:solidFill>
-                  <a:srgbClr val="838787"/>
-                </a:solidFill>
-                <a:uFillTx/>
-                <a:latin typeface="Avenir Next Medium"/>
-                <a:ea typeface="Avenir Next Medium"/>
-                <a:cs typeface="Avenir Next Medium"/>
-                <a:sym typeface="Avenir Next Medium"/>
-              </a:defRPr>
-            </a:lvl8pPr>
-            <a:lvl9pPr marL="4000500" marR="0" indent="-444500" algn="l" defTabSz="584200" rtl="0" latinLnBrk="0">
-              <a:lnSpc>
-                <a:spcPct val="100000"/>
-              </a:lnSpc>
-              <a:spcBef>
-                <a:spcPts val="2800"/>
-              </a:spcBef>
-              <a:spcAft>
-                <a:spcPts val="0"/>
-              </a:spcAft>
-              <a:buClr>
-                <a:schemeClr val="accent1">
-                  <a:satOff val="-4060"/>
-                </a:schemeClr>
-              </a:buClr>
-              <a:buSzPct val="104999"/>
-              <a:buFont typeface="Avenir Next"/>
-              <a:buChar char="‣"/>
-              <a:tabLst/>
-              <a:defRPr sz="3400" b="0" i="0" u="none" strike="noStrike" cap="none" spc="0" baseline="0">
-                <a:solidFill>
-                  <a:srgbClr val="838787"/>
-                </a:solidFill>
-                <a:uFillTx/>
-                <a:latin typeface="Avenir Next Medium"/>
-                <a:ea typeface="Avenir Next Medium"/>
-                <a:cs typeface="Avenir Next Medium"/>
-                <a:sym typeface="Avenir Next Medium"/>
-              </a:defRPr>
-            </a:lvl9pPr>
-          </a:lstStyle>
-          <a:p>
-            <a:pPr hangingPunct="1"/>
-            <a:r>
-              <a:rPr lang="ja-JP" altLang="en-US" dirty="0">
-                <a:latin typeface="Meiryo UI" panose="020B0604030504040204" pitchFamily="50" charset="-128"/>
-                <a:ea typeface="Meiryo UI" panose="020B0604030504040204" pitchFamily="50" charset="-128"/>
-              </a:rPr>
-              <a:t>プログラミングをする上で大切なこと</a:t>
-            </a:r>
-            <a:endParaRPr lang="zh-TW" altLang="en-US" dirty="0">
-              <a:latin typeface="Meiryo UI" panose="020B0604030504040204" pitchFamily="50" charset="-128"/>
-              <a:ea typeface="Meiryo UI" panose="020B0604030504040204" pitchFamily="50" charset="-128"/>
-            </a:endParaRPr>
-          </a:p>
-        </p:txBody>
-      </p:sp>
-    </p:spTree>
-  </p:cSld>
-  <p:clrMapOvr>
-    <a:masterClrMapping/>
-  </p:clrMapOvr>
-  <p:transition spd="med"/>
-</p:sld>
-</file>
-
-<file path=ppt/slides/slide40.xml><?xml version="1.0" encoding="utf-8"?>
-<p:sld xmlns:a="http://schemas.openxmlformats.org/drawingml/2006/main" xmlns:r="http://schemas.openxmlformats.org/officeDocument/2006/relationships" xmlns:p="http://schemas.openxmlformats.org/presentationml/2006/main">
-  <p:cSld>
-    <p:spTree>
-      <p:nvGrpSpPr>
-        <p:cNvPr id="1" name=""/>
-        <p:cNvGrpSpPr/>
-        <p:nvPr/>
-      </p:nvGrpSpPr>
-      <p:grpSpPr>
-        <a:xfrm>
-          <a:off x="0" y="0"/>
-          <a:ext cx="0" cy="0"/>
-          <a:chOff x="0" y="0"/>
-          <a:chExt cx="0" cy="0"/>
-        </a:xfrm>
-      </p:grpSpPr>
-      <p:sp>
-        <p:nvSpPr>
-          <p:cNvPr id="349" name="Html TAG / css 屬性都要記起來嗎？"/>
-          <p:cNvSpPr txBox="1">
-            <a:spLocks noGrp="1"/>
-          </p:cNvSpPr>
-          <p:nvPr>
-            <p:ph type="subTitle" sz="quarter" idx="1"/>
-          </p:nvPr>
-        </p:nvSpPr>
-        <p:spPr>
-          <a:prstGeom prst="rect">
-            <a:avLst/>
-          </a:prstGeom>
-        </p:spPr>
-        <p:txBody>
-          <a:bodyPr/>
-          <a:lstStyle/>
-          <a:p>
-            <a:r>
-              <a:rPr dirty="0"/>
-              <a:t>Html TAG / </a:t>
-            </a:r>
-            <a:r>
-              <a:rPr dirty="0" err="1"/>
-              <a:t>css</a:t>
-            </a:r>
-            <a:r>
-              <a:rPr dirty="0"/>
-              <a:t> </a:t>
-            </a:r>
-            <a:r>
-              <a:rPr lang="ja-JP" altLang="en-US" dirty="0"/>
-              <a:t>の属性</a:t>
-            </a:r>
-            <a:endParaRPr dirty="0"/>
-          </a:p>
-        </p:txBody>
-      </p:sp>
-      <p:sp>
-        <p:nvSpPr>
-          <p:cNvPr id="3" name="思考邏輯">
-            <a:extLst>
-              <a:ext uri="{FF2B5EF4-FFF2-40B4-BE49-F238E27FC236}">
-                <a16:creationId xmlns:a16="http://schemas.microsoft.com/office/drawing/2014/main" id="{A5F62ED9-5E91-444E-864C-741066DF9F96}"/>
-              </a:ext>
-            </a:extLst>
-          </p:cNvPr>
-          <p:cNvSpPr txBox="1">
-            <a:spLocks/>
-          </p:cNvSpPr>
-          <p:nvPr/>
-        </p:nvSpPr>
-        <p:spPr>
-          <a:xfrm>
-            <a:off x="406400" y="6426200"/>
-            <a:ext cx="12192000" cy="2705100"/>
-          </a:xfrm>
-          <a:prstGeom prst="rect">
-            <a:avLst/>
-          </a:prstGeom>
-          <a:ln w="12700">
-            <a:miter lim="400000"/>
-          </a:ln>
-          <a:extLst>
-            <a:ext uri="{C572A759-6A51-4108-AA02-DFA0A04FC94B}">
-              <ma14:wrappingTextBoxFlag xmlns="" xmlns:m="http://schemas.openxmlformats.org/officeDocument/2006/math" xmlns:a14="http://schemas.microsoft.com/office/drawing/2010/main" xmlns:ma14="http://schemas.microsoft.com/office/mac/drawingml/2011/main" val="1"/>
-            </a:ext>
-          </a:extLst>
-        </p:spPr>
-        <p:txBody>
-          <a:bodyPr lIns="50800" tIns="50800" rIns="50800" bIns="50800">
-            <a:normAutofit/>
-          </a:bodyPr>
-          <a:lstStyle>
-            <a:lvl1pPr marL="0" marR="0" indent="0" algn="ctr" defTabSz="502412" rtl="0" latinLnBrk="0">
-              <a:lnSpc>
-                <a:spcPct val="80000"/>
-              </a:lnSpc>
-              <a:spcBef>
-                <a:spcPts val="0"/>
-              </a:spcBef>
-              <a:spcAft>
-                <a:spcPts val="0"/>
-              </a:spcAft>
-              <a:buClrTx/>
-              <a:buSzTx/>
-              <a:buFontTx/>
-              <a:buNone/>
-              <a:tabLst/>
-              <a:defRPr sz="14620" b="1" i="0" u="none" strike="noStrike" cap="all" spc="0" baseline="0">
-                <a:solidFill>
-                  <a:schemeClr val="accent1"/>
-                </a:solidFill>
-                <a:uFillTx/>
-                <a:latin typeface="+mn-lt"/>
-                <a:ea typeface="+mn-ea"/>
-                <a:cs typeface="+mn-cs"/>
-                <a:sym typeface="Baskerville"/>
-              </a:defRPr>
-            </a:lvl1pPr>
-            <a:lvl2pPr marL="0" marR="0" indent="0" algn="l" defTabSz="584200" rtl="0" latinLnBrk="0">
-              <a:lnSpc>
-                <a:spcPct val="80000"/>
-              </a:lnSpc>
-              <a:spcBef>
-                <a:spcPts val="2800"/>
-              </a:spcBef>
-              <a:spcAft>
-                <a:spcPts val="0"/>
-              </a:spcAft>
-              <a:buClrTx/>
-              <a:buSzTx/>
-              <a:buFontTx/>
-              <a:buNone/>
-              <a:tabLst/>
-              <a:defRPr sz="6000" b="1" i="0" u="none" strike="noStrike" cap="all" spc="0" baseline="0">
-                <a:solidFill>
-                  <a:schemeClr val="accent1"/>
-                </a:solidFill>
-                <a:uFillTx/>
-                <a:latin typeface="+mn-lt"/>
-                <a:ea typeface="+mn-ea"/>
-                <a:cs typeface="+mn-cs"/>
-                <a:sym typeface="Baskerville"/>
-              </a:defRPr>
-            </a:lvl2pPr>
-            <a:lvl3pPr marL="0" marR="0" indent="0" algn="l" defTabSz="584200" rtl="0" latinLnBrk="0">
-              <a:lnSpc>
-                <a:spcPct val="80000"/>
-              </a:lnSpc>
-              <a:spcBef>
-                <a:spcPts val="2800"/>
-              </a:spcBef>
-              <a:spcAft>
-                <a:spcPts val="0"/>
-              </a:spcAft>
-              <a:buClrTx/>
-              <a:buSzTx/>
-              <a:buFontTx/>
-              <a:buNone/>
-              <a:tabLst/>
-              <a:defRPr sz="6000" b="1" i="0" u="none" strike="noStrike" cap="all" spc="0" baseline="0">
-                <a:solidFill>
-                  <a:schemeClr val="accent1"/>
-                </a:solidFill>
-                <a:uFillTx/>
-                <a:latin typeface="+mn-lt"/>
-                <a:ea typeface="+mn-ea"/>
-                <a:cs typeface="+mn-cs"/>
-                <a:sym typeface="Baskerville"/>
-              </a:defRPr>
-            </a:lvl3pPr>
-            <a:lvl4pPr marL="0" marR="0" indent="0" algn="l" defTabSz="584200" rtl="0" latinLnBrk="0">
-              <a:lnSpc>
-                <a:spcPct val="80000"/>
-              </a:lnSpc>
-              <a:spcBef>
-                <a:spcPts val="2800"/>
-              </a:spcBef>
-              <a:spcAft>
-                <a:spcPts val="0"/>
-              </a:spcAft>
-              <a:buClrTx/>
-              <a:buSzTx/>
-              <a:buFontTx/>
-              <a:buNone/>
-              <a:tabLst/>
-              <a:defRPr sz="6000" b="1" i="0" u="none" strike="noStrike" cap="all" spc="0" baseline="0">
-                <a:solidFill>
-                  <a:schemeClr val="accent1"/>
-                </a:solidFill>
-                <a:uFillTx/>
-                <a:latin typeface="+mn-lt"/>
-                <a:ea typeface="+mn-ea"/>
-                <a:cs typeface="+mn-cs"/>
-                <a:sym typeface="Baskerville"/>
-              </a:defRPr>
-            </a:lvl4pPr>
-            <a:lvl5pPr marL="0" marR="0" indent="0" algn="l" defTabSz="584200" rtl="0" latinLnBrk="0">
-              <a:lnSpc>
-                <a:spcPct val="80000"/>
-              </a:lnSpc>
-              <a:spcBef>
-                <a:spcPts val="2800"/>
-              </a:spcBef>
-              <a:spcAft>
-                <a:spcPts val="0"/>
-              </a:spcAft>
-              <a:buClrTx/>
-              <a:buSzTx/>
-              <a:buFontTx/>
-              <a:buNone/>
-              <a:tabLst/>
-              <a:defRPr sz="6000" b="1" i="0" u="none" strike="noStrike" cap="all" spc="0" baseline="0">
-                <a:solidFill>
-                  <a:schemeClr val="accent1"/>
-                </a:solidFill>
-                <a:uFillTx/>
-                <a:latin typeface="+mn-lt"/>
-                <a:ea typeface="+mn-ea"/>
-                <a:cs typeface="+mn-cs"/>
-                <a:sym typeface="Baskerville"/>
-              </a:defRPr>
-            </a:lvl5pPr>
-            <a:lvl6pPr marL="0" marR="0" indent="0" algn="l" defTabSz="584200" rtl="0" latinLnBrk="0">
-              <a:lnSpc>
-                <a:spcPct val="80000"/>
-              </a:lnSpc>
-              <a:spcBef>
-                <a:spcPts val="2800"/>
-              </a:spcBef>
-              <a:spcAft>
-                <a:spcPts val="0"/>
-              </a:spcAft>
-              <a:buClrTx/>
-              <a:buSzTx/>
-              <a:buFontTx/>
-              <a:buNone/>
-              <a:tabLst/>
-              <a:defRPr sz="6000" b="1" i="0" u="none" strike="noStrike" cap="all" spc="0" baseline="0">
-                <a:solidFill>
-                  <a:schemeClr val="accent1"/>
-                </a:solidFill>
-                <a:uFillTx/>
-                <a:latin typeface="+mn-lt"/>
-                <a:ea typeface="+mn-ea"/>
-                <a:cs typeface="+mn-cs"/>
-                <a:sym typeface="Baskerville"/>
-              </a:defRPr>
-            </a:lvl6pPr>
-            <a:lvl7pPr marL="0" marR="0" indent="0" algn="l" defTabSz="584200" rtl="0" latinLnBrk="0">
-              <a:lnSpc>
-                <a:spcPct val="80000"/>
-              </a:lnSpc>
-              <a:spcBef>
-                <a:spcPts val="2800"/>
-              </a:spcBef>
-              <a:spcAft>
-                <a:spcPts val="0"/>
-              </a:spcAft>
-              <a:buClrTx/>
-              <a:buSzTx/>
-              <a:buFontTx/>
-              <a:buNone/>
-              <a:tabLst/>
-              <a:defRPr sz="6000" b="1" i="0" u="none" strike="noStrike" cap="all" spc="0" baseline="0">
-                <a:solidFill>
-                  <a:schemeClr val="accent1"/>
-                </a:solidFill>
-                <a:uFillTx/>
-                <a:latin typeface="+mn-lt"/>
-                <a:ea typeface="+mn-ea"/>
-                <a:cs typeface="+mn-cs"/>
-                <a:sym typeface="Baskerville"/>
-              </a:defRPr>
-            </a:lvl7pPr>
-            <a:lvl8pPr marL="0" marR="0" indent="0" algn="l" defTabSz="584200" rtl="0" latinLnBrk="0">
-              <a:lnSpc>
-                <a:spcPct val="80000"/>
-              </a:lnSpc>
-              <a:spcBef>
-                <a:spcPts val="2800"/>
-              </a:spcBef>
-              <a:spcAft>
-                <a:spcPts val="0"/>
-              </a:spcAft>
-              <a:buClrTx/>
-              <a:buSzTx/>
-              <a:buFontTx/>
-              <a:buNone/>
-              <a:tabLst/>
-              <a:defRPr sz="6000" b="1" i="0" u="none" strike="noStrike" cap="all" spc="0" baseline="0">
-                <a:solidFill>
-                  <a:schemeClr val="accent1"/>
-                </a:solidFill>
-                <a:uFillTx/>
-                <a:latin typeface="+mn-lt"/>
-                <a:ea typeface="+mn-ea"/>
-                <a:cs typeface="+mn-cs"/>
-                <a:sym typeface="Baskerville"/>
-              </a:defRPr>
-            </a:lvl8pPr>
-            <a:lvl9pPr marL="0" marR="0" indent="0" algn="l" defTabSz="584200" rtl="0" latinLnBrk="0">
-              <a:lnSpc>
-                <a:spcPct val="80000"/>
-              </a:lnSpc>
-              <a:spcBef>
-                <a:spcPts val="2800"/>
-              </a:spcBef>
-              <a:spcAft>
-                <a:spcPts val="0"/>
-              </a:spcAft>
-              <a:buClrTx/>
-              <a:buSzTx/>
-              <a:buFontTx/>
-              <a:buNone/>
-              <a:tabLst/>
-              <a:defRPr sz="6000" b="1" i="0" u="none" strike="noStrike" cap="all" spc="0" baseline="0">
-                <a:solidFill>
-                  <a:schemeClr val="accent1"/>
-                </a:solidFill>
-                <a:uFillTx/>
-                <a:latin typeface="+mn-lt"/>
-                <a:ea typeface="+mn-ea"/>
-                <a:cs typeface="+mn-cs"/>
-                <a:sym typeface="Baskerville"/>
-              </a:defRPr>
-            </a:lvl9pPr>
-          </a:lstStyle>
-          <a:p>
-            <a:pPr algn="r" hangingPunct="1"/>
-            <a:r>
-              <a:rPr lang="ja-JP" altLang="en-US" sz="4800" dirty="0">
-                <a:latin typeface="Meiryo UI" panose="020B0604030504040204" pitchFamily="50" charset="-128"/>
-                <a:ea typeface="Meiryo UI" panose="020B0604030504040204" pitchFamily="50" charset="-128"/>
-              </a:rPr>
-              <a:t>全部覚えないといけない？</a:t>
-            </a:r>
-          </a:p>
-        </p:txBody>
-      </p:sp>
-    </p:spTree>
-  </p:cSld>
-  <p:clrMapOvr>
-    <a:masterClrMapping/>
-  </p:clrMapOvr>
-  <p:transition spd="med"/>
-</p:sld>
-</file>
-
-<file path=ppt/slides/slide41.xml><?xml version="1.0" encoding="utf-8"?>
 <p:sld xmlns:a="http://schemas.openxmlformats.org/drawingml/2006/main" xmlns:r="http://schemas.openxmlformats.org/officeDocument/2006/relationships" xmlns:p="http://schemas.openxmlformats.org/presentationml/2006/main">
   <p:cSld>
     <p:spTree>
@@ -12951,6 +12114,659 @@
 </p:sld>
 </file>
 
+<file path=ppt/slides/slide4.xml><?xml version="1.0" encoding="utf-8"?>
+<p:sld xmlns:a="http://schemas.openxmlformats.org/drawingml/2006/main" xmlns:r="http://schemas.openxmlformats.org/officeDocument/2006/relationships" xmlns:p="http://schemas.openxmlformats.org/presentationml/2006/main">
+  <p:cSld>
+    <p:spTree>
+      <p:nvGrpSpPr>
+        <p:cNvPr id="1" name=""/>
+        <p:cNvGrpSpPr/>
+        <p:nvPr/>
+      </p:nvGrpSpPr>
+      <p:grpSpPr>
+        <a:xfrm>
+          <a:off x="0" y="0"/>
+          <a:ext cx="0" cy="0"/>
+          <a:chOff x="0" y="0"/>
+          <a:chExt cx="0" cy="0"/>
+        </a:xfrm>
+      </p:grpSpPr>
+      <p:sp>
+        <p:nvSpPr>
+          <p:cNvPr id="175" name="程式邏輯"/>
+          <p:cNvSpPr txBox="1">
+            <a:spLocks noGrp="1"/>
+          </p:cNvSpPr>
+          <p:nvPr>
+            <p:ph type="ctrTitle"/>
+          </p:nvPr>
+        </p:nvSpPr>
+        <p:spPr>
+          <a:prstGeom prst="rect">
+            <a:avLst/>
+          </a:prstGeom>
+        </p:spPr>
+        <p:txBody>
+          <a:bodyPr>
+            <a:noAutofit/>
+          </a:bodyPr>
+          <a:lstStyle>
+            <a:lvl1pPr algn="ctr" defTabSz="502412">
+              <a:defRPr sz="14620"/>
+            </a:lvl1pPr>
+          </a:lstStyle>
+          <a:p>
+            <a:pPr algn="r"/>
+            <a:r>
+              <a:rPr lang="ja-JP" altLang="en-US" sz="7200" dirty="0">
+                <a:latin typeface="Meiryo UI" panose="020B0604030504040204" pitchFamily="50" charset="-128"/>
+                <a:ea typeface="Meiryo UI" panose="020B0604030504040204" pitchFamily="50" charset="-128"/>
+              </a:rPr>
+              <a:t>言語のロジック</a:t>
+            </a:r>
+            <a:endParaRPr sz="7200" dirty="0">
+              <a:latin typeface="Meiryo UI" panose="020B0604030504040204" pitchFamily="50" charset="-128"/>
+              <a:ea typeface="Meiryo UI" panose="020B0604030504040204" pitchFamily="50" charset="-128"/>
+            </a:endParaRPr>
+          </a:p>
+        </p:txBody>
+      </p:sp>
+      <p:sp>
+        <p:nvSpPr>
+          <p:cNvPr id="7" name="寫程式最重要的是什麼？">
+            <a:extLst>
+              <a:ext uri="{FF2B5EF4-FFF2-40B4-BE49-F238E27FC236}">
+                <a16:creationId xmlns:a16="http://schemas.microsoft.com/office/drawing/2014/main" id="{9E06758C-818C-4A51-80DF-F4E6FBE6321C}"/>
+              </a:ext>
+            </a:extLst>
+          </p:cNvPr>
+          <p:cNvSpPr txBox="1">
+            <a:spLocks/>
+          </p:cNvSpPr>
+          <p:nvPr/>
+        </p:nvSpPr>
+        <p:spPr>
+          <a:xfrm>
+            <a:off x="406400" y="4267200"/>
+            <a:ext cx="12192000" cy="1803400"/>
+          </a:xfrm>
+          <a:prstGeom prst="rect">
+            <a:avLst/>
+          </a:prstGeom>
+          <a:ln w="12700">
+            <a:miter lim="400000"/>
+          </a:ln>
+          <a:extLst>
+            <a:ext uri="{C572A759-6A51-4108-AA02-DFA0A04FC94B}">
+              <ma14:wrappingTextBoxFlag xmlns:ma14="http://schemas.microsoft.com/office/mac/drawingml/2011/main" xmlns:a14="http://schemas.microsoft.com/office/drawing/2010/main" xmlns:m="http://schemas.openxmlformats.org/officeDocument/2006/math" xmlns="" val="1"/>
+            </a:ext>
+          </a:extLst>
+        </p:spPr>
+        <p:txBody>
+          <a:bodyPr lIns="50800" tIns="50800" rIns="50800" bIns="50800" anchor="b">
+            <a:normAutofit/>
+          </a:bodyPr>
+          <a:lstStyle>
+            <a:lvl1pPr marL="0" marR="0" indent="0" algn="l" defTabSz="584200" rtl="0" latinLnBrk="0">
+              <a:lnSpc>
+                <a:spcPct val="80000"/>
+              </a:lnSpc>
+              <a:spcBef>
+                <a:spcPts val="2300"/>
+              </a:spcBef>
+              <a:spcAft>
+                <a:spcPts val="0"/>
+              </a:spcAft>
+              <a:buClrTx/>
+              <a:buSzTx/>
+              <a:buFontTx/>
+              <a:buNone/>
+              <a:tabLst/>
+              <a:defRPr sz="5400" b="0" i="0" u="none" strike="noStrike" cap="all" spc="0" baseline="0">
+                <a:solidFill>
+                  <a:srgbClr val="A6AAA9"/>
+                </a:solidFill>
+                <a:uFillTx/>
+                <a:latin typeface="+mn-lt"/>
+                <a:ea typeface="+mn-ea"/>
+                <a:cs typeface="+mn-cs"/>
+                <a:sym typeface="Baskerville"/>
+              </a:defRPr>
+            </a:lvl1pPr>
+            <a:lvl2pPr marL="0" marR="0" indent="0" algn="l" defTabSz="584200" rtl="0" latinLnBrk="0">
+              <a:lnSpc>
+                <a:spcPct val="80000"/>
+              </a:lnSpc>
+              <a:spcBef>
+                <a:spcPts val="2300"/>
+              </a:spcBef>
+              <a:spcAft>
+                <a:spcPts val="0"/>
+              </a:spcAft>
+              <a:buClrTx/>
+              <a:buSzTx/>
+              <a:buFontTx/>
+              <a:buNone/>
+              <a:tabLst/>
+              <a:defRPr sz="5400" b="0" i="0" u="none" strike="noStrike" cap="all" spc="0" baseline="0">
+                <a:solidFill>
+                  <a:srgbClr val="A6AAA9"/>
+                </a:solidFill>
+                <a:uFillTx/>
+                <a:latin typeface="+mn-lt"/>
+                <a:ea typeface="+mn-ea"/>
+                <a:cs typeface="+mn-cs"/>
+                <a:sym typeface="Baskerville"/>
+              </a:defRPr>
+            </a:lvl2pPr>
+            <a:lvl3pPr marL="0" marR="0" indent="0" algn="l" defTabSz="584200" rtl="0" latinLnBrk="0">
+              <a:lnSpc>
+                <a:spcPct val="80000"/>
+              </a:lnSpc>
+              <a:spcBef>
+                <a:spcPts val="2300"/>
+              </a:spcBef>
+              <a:spcAft>
+                <a:spcPts val="0"/>
+              </a:spcAft>
+              <a:buClrTx/>
+              <a:buSzTx/>
+              <a:buFontTx/>
+              <a:buNone/>
+              <a:tabLst/>
+              <a:defRPr sz="5400" b="0" i="0" u="none" strike="noStrike" cap="all" spc="0" baseline="0">
+                <a:solidFill>
+                  <a:srgbClr val="A6AAA9"/>
+                </a:solidFill>
+                <a:uFillTx/>
+                <a:latin typeface="+mn-lt"/>
+                <a:ea typeface="+mn-ea"/>
+                <a:cs typeface="+mn-cs"/>
+                <a:sym typeface="Baskerville"/>
+              </a:defRPr>
+            </a:lvl3pPr>
+            <a:lvl4pPr marL="0" marR="0" indent="0" algn="l" defTabSz="584200" rtl="0" latinLnBrk="0">
+              <a:lnSpc>
+                <a:spcPct val="80000"/>
+              </a:lnSpc>
+              <a:spcBef>
+                <a:spcPts val="2300"/>
+              </a:spcBef>
+              <a:spcAft>
+                <a:spcPts val="0"/>
+              </a:spcAft>
+              <a:buClrTx/>
+              <a:buSzTx/>
+              <a:buFontTx/>
+              <a:buNone/>
+              <a:tabLst/>
+              <a:defRPr sz="5400" b="0" i="0" u="none" strike="noStrike" cap="all" spc="0" baseline="0">
+                <a:solidFill>
+                  <a:srgbClr val="A6AAA9"/>
+                </a:solidFill>
+                <a:uFillTx/>
+                <a:latin typeface="+mn-lt"/>
+                <a:ea typeface="+mn-ea"/>
+                <a:cs typeface="+mn-cs"/>
+                <a:sym typeface="Baskerville"/>
+              </a:defRPr>
+            </a:lvl4pPr>
+            <a:lvl5pPr marL="0" marR="0" indent="0" algn="l" defTabSz="584200" rtl="0" latinLnBrk="0">
+              <a:lnSpc>
+                <a:spcPct val="80000"/>
+              </a:lnSpc>
+              <a:spcBef>
+                <a:spcPts val="2300"/>
+              </a:spcBef>
+              <a:spcAft>
+                <a:spcPts val="0"/>
+              </a:spcAft>
+              <a:buClrTx/>
+              <a:buSzTx/>
+              <a:buFontTx/>
+              <a:buNone/>
+              <a:tabLst/>
+              <a:defRPr sz="5400" b="0" i="0" u="none" strike="noStrike" cap="all" spc="0" baseline="0">
+                <a:solidFill>
+                  <a:srgbClr val="A6AAA9"/>
+                </a:solidFill>
+                <a:uFillTx/>
+                <a:latin typeface="+mn-lt"/>
+                <a:ea typeface="+mn-ea"/>
+                <a:cs typeface="+mn-cs"/>
+                <a:sym typeface="Baskerville"/>
+              </a:defRPr>
+            </a:lvl5pPr>
+            <a:lvl6pPr marL="2667000" marR="0" indent="-444500" algn="l" defTabSz="584200" rtl="0" latinLnBrk="0">
+              <a:lnSpc>
+                <a:spcPct val="100000"/>
+              </a:lnSpc>
+              <a:spcBef>
+                <a:spcPts val="2800"/>
+              </a:spcBef>
+              <a:spcAft>
+                <a:spcPts val="0"/>
+              </a:spcAft>
+              <a:buClr>
+                <a:schemeClr val="accent1">
+                  <a:satOff val="-4060"/>
+                </a:schemeClr>
+              </a:buClr>
+              <a:buSzPct val="104999"/>
+              <a:buFont typeface="Avenir Next"/>
+              <a:buChar char="‣"/>
+              <a:tabLst/>
+              <a:defRPr sz="3400" b="0" i="0" u="none" strike="noStrike" cap="none" spc="0" baseline="0">
+                <a:solidFill>
+                  <a:srgbClr val="838787"/>
+                </a:solidFill>
+                <a:uFillTx/>
+                <a:latin typeface="Avenir Next Medium"/>
+                <a:ea typeface="Avenir Next Medium"/>
+                <a:cs typeface="Avenir Next Medium"/>
+                <a:sym typeface="Avenir Next Medium"/>
+              </a:defRPr>
+            </a:lvl6pPr>
+            <a:lvl7pPr marL="3111500" marR="0" indent="-444500" algn="l" defTabSz="584200" rtl="0" latinLnBrk="0">
+              <a:lnSpc>
+                <a:spcPct val="100000"/>
+              </a:lnSpc>
+              <a:spcBef>
+                <a:spcPts val="2800"/>
+              </a:spcBef>
+              <a:spcAft>
+                <a:spcPts val="0"/>
+              </a:spcAft>
+              <a:buClr>
+                <a:schemeClr val="accent1">
+                  <a:satOff val="-4060"/>
+                </a:schemeClr>
+              </a:buClr>
+              <a:buSzPct val="104999"/>
+              <a:buFont typeface="Avenir Next"/>
+              <a:buChar char="‣"/>
+              <a:tabLst/>
+              <a:defRPr sz="3400" b="0" i="0" u="none" strike="noStrike" cap="none" spc="0" baseline="0">
+                <a:solidFill>
+                  <a:srgbClr val="838787"/>
+                </a:solidFill>
+                <a:uFillTx/>
+                <a:latin typeface="Avenir Next Medium"/>
+                <a:ea typeface="Avenir Next Medium"/>
+                <a:cs typeface="Avenir Next Medium"/>
+                <a:sym typeface="Avenir Next Medium"/>
+              </a:defRPr>
+            </a:lvl7pPr>
+            <a:lvl8pPr marL="3556000" marR="0" indent="-444500" algn="l" defTabSz="584200" rtl="0" latinLnBrk="0">
+              <a:lnSpc>
+                <a:spcPct val="100000"/>
+              </a:lnSpc>
+              <a:spcBef>
+                <a:spcPts val="2800"/>
+              </a:spcBef>
+              <a:spcAft>
+                <a:spcPts val="0"/>
+              </a:spcAft>
+              <a:buClr>
+                <a:schemeClr val="accent1">
+                  <a:satOff val="-4060"/>
+                </a:schemeClr>
+              </a:buClr>
+              <a:buSzPct val="104999"/>
+              <a:buFont typeface="Avenir Next"/>
+              <a:buChar char="‣"/>
+              <a:tabLst/>
+              <a:defRPr sz="3400" b="0" i="0" u="none" strike="noStrike" cap="none" spc="0" baseline="0">
+                <a:solidFill>
+                  <a:srgbClr val="838787"/>
+                </a:solidFill>
+                <a:uFillTx/>
+                <a:latin typeface="Avenir Next Medium"/>
+                <a:ea typeface="Avenir Next Medium"/>
+                <a:cs typeface="Avenir Next Medium"/>
+                <a:sym typeface="Avenir Next Medium"/>
+              </a:defRPr>
+            </a:lvl8pPr>
+            <a:lvl9pPr marL="4000500" marR="0" indent="-444500" algn="l" defTabSz="584200" rtl="0" latinLnBrk="0">
+              <a:lnSpc>
+                <a:spcPct val="100000"/>
+              </a:lnSpc>
+              <a:spcBef>
+                <a:spcPts val="2800"/>
+              </a:spcBef>
+              <a:spcAft>
+                <a:spcPts val="0"/>
+              </a:spcAft>
+              <a:buClr>
+                <a:schemeClr val="accent1">
+                  <a:satOff val="-4060"/>
+                </a:schemeClr>
+              </a:buClr>
+              <a:buSzPct val="104999"/>
+              <a:buFont typeface="Avenir Next"/>
+              <a:buChar char="‣"/>
+              <a:tabLst/>
+              <a:defRPr sz="3400" b="0" i="0" u="none" strike="noStrike" cap="none" spc="0" baseline="0">
+                <a:solidFill>
+                  <a:srgbClr val="838787"/>
+                </a:solidFill>
+                <a:uFillTx/>
+                <a:latin typeface="Avenir Next Medium"/>
+                <a:ea typeface="Avenir Next Medium"/>
+                <a:cs typeface="Avenir Next Medium"/>
+                <a:sym typeface="Avenir Next Medium"/>
+              </a:defRPr>
+            </a:lvl9pPr>
+          </a:lstStyle>
+          <a:p>
+            <a:pPr hangingPunct="1"/>
+            <a:r>
+              <a:rPr lang="en-US" altLang="ja-JP" dirty="0">
+                <a:latin typeface="Meiryo UI" panose="020B0604030504040204" pitchFamily="50" charset="-128"/>
+                <a:ea typeface="Meiryo UI" panose="020B0604030504040204" pitchFamily="50" charset="-128"/>
+              </a:rPr>
+              <a:t>Web</a:t>
+            </a:r>
+            <a:r>
+              <a:rPr lang="ja-JP" altLang="en-US" dirty="0">
+                <a:latin typeface="Meiryo UI" panose="020B0604030504040204" pitchFamily="50" charset="-128"/>
+                <a:ea typeface="Meiryo UI" panose="020B0604030504040204" pitchFamily="50" charset="-128"/>
+              </a:rPr>
+              <a:t>開発で大切なこと</a:t>
+            </a:r>
+            <a:endParaRPr lang="zh-TW" altLang="en-US" dirty="0">
+              <a:latin typeface="Meiryo UI" panose="020B0604030504040204" pitchFamily="50" charset="-128"/>
+              <a:ea typeface="Meiryo UI" panose="020B0604030504040204" pitchFamily="50" charset="-128"/>
+            </a:endParaRPr>
+          </a:p>
+        </p:txBody>
+      </p:sp>
+    </p:spTree>
+  </p:cSld>
+  <p:clrMapOvr>
+    <a:masterClrMapping/>
+  </p:clrMapOvr>
+  <p:transition spd="med"/>
+</p:sld>
+</file>
+
+<file path=ppt/slides/slide40.xml><?xml version="1.0" encoding="utf-8"?>
+<p:sld xmlns:a="http://schemas.openxmlformats.org/drawingml/2006/main" xmlns:r="http://schemas.openxmlformats.org/officeDocument/2006/relationships" xmlns:p="http://schemas.openxmlformats.org/presentationml/2006/main">
+  <p:cSld>
+    <p:spTree>
+      <p:nvGrpSpPr>
+        <p:cNvPr id="1" name=""/>
+        <p:cNvGrpSpPr/>
+        <p:nvPr/>
+      </p:nvGrpSpPr>
+      <p:grpSpPr>
+        <a:xfrm>
+          <a:off x="0" y="0"/>
+          <a:ext cx="0" cy="0"/>
+          <a:chOff x="0" y="0"/>
+          <a:chExt cx="0" cy="0"/>
+        </a:xfrm>
+      </p:grpSpPr>
+      <p:sp>
+        <p:nvSpPr>
+          <p:cNvPr id="355" name="BootstrAp"/>
+          <p:cNvSpPr txBox="1">
+            <a:spLocks noGrp="1"/>
+          </p:cNvSpPr>
+          <p:nvPr>
+            <p:ph type="title"/>
+          </p:nvPr>
+        </p:nvSpPr>
+        <p:spPr>
+          <a:prstGeom prst="rect">
+            <a:avLst/>
+          </a:prstGeom>
+        </p:spPr>
+        <p:txBody>
+          <a:bodyPr>
+            <a:normAutofit/>
+          </a:bodyPr>
+          <a:lstStyle>
+            <a:lvl1pPr>
+              <a:defRPr sz="14900"/>
+            </a:lvl1pPr>
+          </a:lstStyle>
+          <a:p>
+            <a:pPr algn="ctr"/>
+            <a:r>
+              <a:rPr sz="12400" dirty="0">
+                <a:latin typeface="Meiryo UI" panose="020B0604030504040204" pitchFamily="50" charset="-128"/>
+                <a:ea typeface="Meiryo UI" panose="020B0604030504040204" pitchFamily="50" charset="-128"/>
+              </a:rPr>
+              <a:t>BootstrAp</a:t>
+            </a:r>
+          </a:p>
+        </p:txBody>
+      </p:sp>
+      <p:sp>
+        <p:nvSpPr>
+          <p:cNvPr id="356" name="https://getbootstrap.com/"/>
+          <p:cNvSpPr txBox="1"/>
+          <p:nvPr/>
+        </p:nvSpPr>
+        <p:spPr>
+          <a:xfrm>
+            <a:off x="697867" y="6161005"/>
+            <a:ext cx="11609066" cy="953723"/>
+          </a:xfrm>
+          <a:prstGeom prst="rect">
+            <a:avLst/>
+          </a:prstGeom>
+          <a:ln w="12700">
+            <a:miter lim="400000"/>
+          </a:ln>
+          <a:extLst>
+            <a:ext uri="{C572A759-6A51-4108-AA02-DFA0A04FC94B}">
+              <ma14:wrappingTextBoxFlag xmlns:ma14="http://schemas.microsoft.com/office/mac/drawingml/2011/main" xmlns:a14="http://schemas.microsoft.com/office/drawing/2010/main" xmlns:m="http://schemas.openxmlformats.org/officeDocument/2006/math" xmlns="" val="1"/>
+            </a:ext>
+          </a:extLst>
+        </p:spPr>
+        <p:txBody>
+          <a:bodyPr lIns="50800" tIns="50800" rIns="50800" bIns="50800" anchor="ctr">
+            <a:spAutoFit/>
+          </a:bodyPr>
+          <a:lstStyle>
+            <a:lvl1pPr algn="ctr" defTabSz="457200">
+              <a:lnSpc>
+                <a:spcPts val="7500"/>
+              </a:lnSpc>
+              <a:spcBef>
+                <a:spcPts val="0"/>
+              </a:spcBef>
+              <a:defRPr sz="5100">
+                <a:ln w="0" cap="flat">
+                  <a:solidFill>
+                    <a:srgbClr val="0000EE"/>
+                  </a:solidFill>
+                  <a:prstDash val="solid"/>
+                  <a:miter lim="400000"/>
+                </a:ln>
+                <a:solidFill>
+                  <a:srgbClr val="FFFFFF"/>
+                </a:solidFill>
+                <a:latin typeface="Times"/>
+                <a:ea typeface="Times"/>
+                <a:cs typeface="Times"/>
+                <a:sym typeface="Times"/>
+              </a:defRPr>
+            </a:lvl1pPr>
+          </a:lstStyle>
+          <a:p>
+            <a:pPr>
+              <a:defRPr>
+                <a:noFill/>
+              </a:defRPr>
+            </a:pPr>
+            <a:r>
+              <a:rPr dirty="0">
+                <a:solidFill>
+                  <a:srgbClr val="FFFFFF"/>
+                </a:solidFill>
+                <a:latin typeface="Meiryo UI" panose="020B0604030504040204" pitchFamily="50" charset="-128"/>
+                <a:ea typeface="Meiryo UI" panose="020B0604030504040204" pitchFamily="50" charset="-128"/>
+              </a:rPr>
+              <a:t>https://getbootstrap.com/</a:t>
+            </a:r>
+          </a:p>
+        </p:txBody>
+      </p:sp>
+      <p:sp>
+        <p:nvSpPr>
+          <p:cNvPr id="2" name="正方形/長方形 1">
+            <a:extLst>
+              <a:ext uri="{FF2B5EF4-FFF2-40B4-BE49-F238E27FC236}">
+                <a16:creationId xmlns:a16="http://schemas.microsoft.com/office/drawing/2014/main" id="{0CE329C3-33E4-4157-9A4A-267C1E78B350}"/>
+              </a:ext>
+            </a:extLst>
+          </p:cNvPr>
+          <p:cNvSpPr/>
+          <p:nvPr/>
+        </p:nvSpPr>
+        <p:spPr>
+          <a:xfrm>
+            <a:off x="1950358" y="9237133"/>
+            <a:ext cx="11054442" cy="400110"/>
+          </a:xfrm>
+          <a:prstGeom prst="rect">
+            <a:avLst/>
+          </a:prstGeom>
+        </p:spPr>
+        <p:txBody>
+          <a:bodyPr wrap="square">
+            <a:spAutoFit/>
+          </a:bodyPr>
+          <a:lstStyle/>
+          <a:p>
+            <a:r>
+              <a:rPr lang="en-US" altLang="ja-JP" dirty="0">
+                <a:solidFill>
+                  <a:schemeClr val="tx2">
+                    <a:lumMod val="20000"/>
+                    <a:lumOff val="80000"/>
+                  </a:schemeClr>
+                </a:solidFill>
+                <a:latin typeface="arial" panose="020B0604020202020204" pitchFamily="34" charset="0"/>
+              </a:rPr>
+              <a:t>Definition (English): get (oneself or something) into or out of a situation using existing resources.</a:t>
+            </a:r>
+            <a:endParaRPr lang="ja-JP" altLang="en-US" dirty="0">
+              <a:solidFill>
+                <a:schemeClr val="tx2">
+                  <a:lumMod val="20000"/>
+                  <a:lumOff val="80000"/>
+                </a:schemeClr>
+              </a:solidFill>
+            </a:endParaRPr>
+          </a:p>
+        </p:txBody>
+      </p:sp>
+    </p:spTree>
+  </p:cSld>
+  <p:clrMapOvr>
+    <a:masterClrMapping/>
+  </p:clrMapOvr>
+  <p:transition spd="med"/>
+</p:sld>
+</file>
+
+<file path=ppt/slides/slide41.xml><?xml version="1.0" encoding="utf-8"?>
+<p:sld xmlns:a="http://schemas.openxmlformats.org/drawingml/2006/main" xmlns:r="http://schemas.openxmlformats.org/officeDocument/2006/relationships" xmlns:p="http://schemas.openxmlformats.org/presentationml/2006/main">
+  <p:cSld>
+    <p:spTree>
+      <p:nvGrpSpPr>
+        <p:cNvPr id="1" name=""/>
+        <p:cNvGrpSpPr/>
+        <p:nvPr/>
+      </p:nvGrpSpPr>
+      <p:grpSpPr>
+        <a:xfrm>
+          <a:off x="0" y="0"/>
+          <a:ext cx="0" cy="0"/>
+          <a:chOff x="0" y="0"/>
+          <a:chExt cx="0" cy="0"/>
+        </a:xfrm>
+      </p:grpSpPr>
+      <p:sp>
+        <p:nvSpPr>
+          <p:cNvPr id="358" name="Login 網頁"/>
+          <p:cNvSpPr txBox="1">
+            <a:spLocks noGrp="1"/>
+          </p:cNvSpPr>
+          <p:nvPr>
+            <p:ph type="ctrTitle"/>
+          </p:nvPr>
+        </p:nvSpPr>
+        <p:spPr>
+          <a:prstGeom prst="rect">
+            <a:avLst/>
+          </a:prstGeom>
+        </p:spPr>
+        <p:txBody>
+          <a:bodyPr>
+            <a:normAutofit/>
+          </a:bodyPr>
+          <a:lstStyle>
+            <a:lvl1pPr algn="ctr" defTabSz="438150">
+              <a:defRPr sz="12750"/>
+            </a:lvl1pPr>
+          </a:lstStyle>
+          <a:p>
+            <a:pPr algn="r"/>
+            <a:r>
+              <a:rPr lang="ja-JP" altLang="en-US" sz="9600" dirty="0">
+                <a:latin typeface="Meiryo UI" panose="020B0604030504040204" pitchFamily="50" charset="-128"/>
+                <a:ea typeface="Meiryo UI" panose="020B0604030504040204" pitchFamily="50" charset="-128"/>
+              </a:rPr>
+              <a:t>ログインページ</a:t>
+            </a:r>
+            <a:endParaRPr sz="9600" dirty="0">
+              <a:latin typeface="Meiryo UI" panose="020B0604030504040204" pitchFamily="50" charset="-128"/>
+              <a:ea typeface="Meiryo UI" panose="020B0604030504040204" pitchFamily="50" charset="-128"/>
+            </a:endParaRPr>
+          </a:p>
+        </p:txBody>
+      </p:sp>
+      <p:sp>
+        <p:nvSpPr>
+          <p:cNvPr id="359" name="動手做做看"/>
+          <p:cNvSpPr txBox="1">
+            <a:spLocks noGrp="1"/>
+          </p:cNvSpPr>
+          <p:nvPr>
+            <p:ph type="subTitle" sz="quarter" idx="1"/>
+          </p:nvPr>
+        </p:nvSpPr>
+        <p:spPr>
+          <a:prstGeom prst="rect">
+            <a:avLst/>
+          </a:prstGeom>
+        </p:spPr>
+        <p:txBody>
+          <a:bodyPr/>
+          <a:lstStyle/>
+          <a:p>
+            <a:r>
+              <a:rPr lang="ja-JP" altLang="en-US" dirty="0"/>
+              <a:t>やってみよう！</a:t>
+            </a:r>
+            <a:endParaRPr dirty="0"/>
+          </a:p>
+        </p:txBody>
+      </p:sp>
+    </p:spTree>
+  </p:cSld>
+  <p:clrMapOvr>
+    <a:masterClrMapping/>
+  </p:clrMapOvr>
+  <p:transition spd="med"/>
+</p:sld>
+</file>
+
 <file path=ppt/slides/slide42.xml><?xml version="1.0" encoding="utf-8"?>
 <p:sld xmlns:a="http://schemas.openxmlformats.org/drawingml/2006/main" xmlns:r="http://schemas.openxmlformats.org/officeDocument/2006/relationships" xmlns:p="http://schemas.openxmlformats.org/presentationml/2006/main">
   <p:cSld>
@@ -12970,7 +12786,7 @@
       </p:grpSpPr>
       <p:sp>
         <p:nvSpPr>
-          <p:cNvPr id="355" name="BootstrAp"/>
+          <p:cNvPr id="362" name="動手做做看"/>
           <p:cNvSpPr txBox="1">
             <a:spLocks noGrp="1"/>
           </p:cNvSpPr>
@@ -12984,40 +12800,48 @@
           </a:prstGeom>
         </p:spPr>
         <p:txBody>
-          <a:bodyPr>
-            <a:normAutofit/>
-          </a:bodyPr>
+          <a:bodyPr/>
           <a:lstStyle>
-            <a:lvl1pPr>
-              <a:defRPr sz="14900"/>
+            <a:lvl1pPr defTabSz="338835">
+              <a:spcBef>
+                <a:spcPts val="1600"/>
+              </a:spcBef>
+              <a:defRPr sz="3480"/>
             </a:lvl1pPr>
           </a:lstStyle>
           <a:p>
-            <a:pPr algn="ctr"/>
-            <a:r>
-              <a:rPr sz="12400" dirty="0" err="1">
+            <a:r>
+              <a:rPr lang="ja-JP" altLang="en-US" dirty="0">
                 <a:latin typeface="Meiryo UI" panose="020B0604030504040204" pitchFamily="50" charset="-128"/>
                 <a:ea typeface="Meiryo UI" panose="020B0604030504040204" pitchFamily="50" charset="-128"/>
               </a:rPr>
-              <a:t>BootstrAp</a:t>
-            </a:r>
-            <a:endParaRPr sz="12400" dirty="0">
+              <a:t>やってみよう！</a:t>
+            </a:r>
+            <a:endParaRPr dirty="0">
               <a:latin typeface="Meiryo UI" panose="020B0604030504040204" pitchFamily="50" charset="-128"/>
               <a:ea typeface="Meiryo UI" panose="020B0604030504040204" pitchFamily="50" charset="-128"/>
             </a:endParaRPr>
           </a:p>
         </p:txBody>
       </p:sp>
-      <p:sp>
-        <p:nvSpPr>
-          <p:cNvPr id="356" name="https://getbootstrap.com/"/>
-          <p:cNvSpPr txBox="1"/>
+      <p:pic>
+        <p:nvPicPr>
+          <p:cNvPr id="363" name="影像" descr="影像"/>
+          <p:cNvPicPr>
+            <a:picLocks noChangeAspect="1"/>
+          </p:cNvPicPr>
           <p:nvPr/>
-        </p:nvSpPr>
+        </p:nvPicPr>
+        <p:blipFill>
+          <a:blip r:embed="rId2"/>
+          <a:stretch>
+            <a:fillRect/>
+          </a:stretch>
+        </p:blipFill>
         <p:spPr>
           <a:xfrm>
-            <a:off x="697867" y="6161005"/>
-            <a:ext cx="11609066" cy="953723"/>
+            <a:off x="-1" y="2363706"/>
+            <a:ext cx="13004801" cy="7125547"/>
           </a:xfrm>
           <a:prstGeom prst="rect">
             <a:avLst/>
@@ -13025,111 +12849,8 @@
           <a:ln w="12700">
             <a:miter lim="400000"/>
           </a:ln>
-          <a:extLst>
-            <a:ext uri="{C572A759-6A51-4108-AA02-DFA0A04FC94B}">
-              <ma14:wrappingTextBoxFlag xmlns="" xmlns:m="http://schemas.openxmlformats.org/officeDocument/2006/math" xmlns:a14="http://schemas.microsoft.com/office/drawing/2010/main" xmlns:ma14="http://schemas.microsoft.com/office/mac/drawingml/2011/main" val="1"/>
-            </a:ext>
-          </a:extLst>
-        </p:spPr>
-        <p:txBody>
-          <a:bodyPr lIns="50800" tIns="50800" rIns="50800" bIns="50800" anchor="ctr">
-            <a:spAutoFit/>
-          </a:bodyPr>
-          <a:lstStyle>
-            <a:lvl1pPr algn="ctr" defTabSz="457200">
-              <a:lnSpc>
-                <a:spcPts val="7500"/>
-              </a:lnSpc>
-              <a:spcBef>
-                <a:spcPts val="0"/>
-              </a:spcBef>
-              <a:defRPr sz="5100">
-                <a:ln w="0" cap="flat">
-                  <a:solidFill>
-                    <a:srgbClr val="0000EE"/>
-                  </a:solidFill>
-                  <a:prstDash val="solid"/>
-                  <a:miter lim="400000"/>
-                </a:ln>
-                <a:solidFill>
-                  <a:srgbClr val="FFFFFF"/>
-                </a:solidFill>
-                <a:latin typeface="Times"/>
-                <a:ea typeface="Times"/>
-                <a:cs typeface="Times"/>
-                <a:sym typeface="Times"/>
-              </a:defRPr>
-            </a:lvl1pPr>
-          </a:lstStyle>
-          <a:p>
-            <a:pPr>
-              <a:defRPr>
-                <a:noFill/>
-              </a:defRPr>
-            </a:pPr>
-            <a:r>
-              <a:rPr dirty="0">
-                <a:solidFill>
-                  <a:srgbClr val="FFFFFF"/>
-                </a:solidFill>
-                <a:latin typeface="Meiryo UI" panose="020B0604030504040204" pitchFamily="50" charset="-128"/>
-                <a:ea typeface="Meiryo UI" panose="020B0604030504040204" pitchFamily="50" charset="-128"/>
-              </a:rPr>
-              <a:t>https://getbootstrap.com/</a:t>
-            </a:r>
-          </a:p>
-        </p:txBody>
-      </p:sp>
-      <p:sp>
-        <p:nvSpPr>
-          <p:cNvPr id="2" name="正方形/長方形 1">
-            <a:extLst>
-              <a:ext uri="{FF2B5EF4-FFF2-40B4-BE49-F238E27FC236}">
-                <a16:creationId xmlns:a16="http://schemas.microsoft.com/office/drawing/2014/main" id="{0CE329C3-33E4-4157-9A4A-267C1E78B350}"/>
-              </a:ext>
-            </a:extLst>
-          </p:cNvPr>
-          <p:cNvSpPr/>
-          <p:nvPr/>
-        </p:nvSpPr>
-        <p:spPr>
-          <a:xfrm>
-            <a:off x="1950358" y="9237133"/>
-            <a:ext cx="11054442" cy="400110"/>
-          </a:xfrm>
-          <a:prstGeom prst="rect">
-            <a:avLst/>
-          </a:prstGeom>
-        </p:spPr>
-        <p:txBody>
-          <a:bodyPr wrap="square">
-            <a:spAutoFit/>
-          </a:bodyPr>
-          <a:lstStyle/>
-          <a:p>
-            <a:r>
-              <a:rPr lang="en-US" altLang="ja-JP" dirty="0">
-                <a:solidFill>
-                  <a:schemeClr val="tx2">
-                    <a:lumMod val="20000"/>
-                    <a:lumOff val="80000"/>
-                  </a:schemeClr>
-                </a:solidFill>
-                <a:latin typeface="arial" panose="020B0604020202020204" pitchFamily="34" charset="0"/>
-              </a:rPr>
-              <a:t>Definition (English): get (oneself or something) into or out of a situation using existing resources.</a:t>
-            </a:r>
-            <a:endParaRPr lang="ja-JP" altLang="en-US" dirty="0">
-              <a:solidFill>
-                <a:schemeClr val="tx2">
-                  <a:lumMod val="20000"/>
-                  <a:lumOff val="80000"/>
-                </a:schemeClr>
-              </a:solidFill>
-            </a:endParaRPr>
-          </a:p>
-        </p:txBody>
-      </p:sp>
+        </p:spPr>
+      </p:pic>
     </p:spTree>
   </p:cSld>
   <p:clrMapOvr>
@@ -13158,12 +12879,12 @@
       </p:grpSpPr>
       <p:sp>
         <p:nvSpPr>
-          <p:cNvPr id="358" name="Login 網頁"/>
+          <p:cNvPr id="366" name="動手做做看(template.html)"/>
           <p:cNvSpPr txBox="1">
             <a:spLocks noGrp="1"/>
           </p:cNvSpPr>
           <p:nvPr>
-            <p:ph type="ctrTitle"/>
+            <p:ph type="title"/>
           </p:nvPr>
         </p:nvSpPr>
         <p:spPr>
@@ -13172,57 +12893,62 @@
           </a:prstGeom>
         </p:spPr>
         <p:txBody>
-          <a:bodyPr>
-            <a:normAutofit/>
-          </a:bodyPr>
+          <a:bodyPr/>
           <a:lstStyle>
-            <a:lvl1pPr algn="ctr" defTabSz="438150">
-              <a:defRPr sz="12750"/>
+            <a:lvl1pPr>
+              <a:lnSpc>
+                <a:spcPct val="100000"/>
+              </a:lnSpc>
+              <a:defRPr sz="3400" b="0" cap="none">
+                <a:solidFill>
+                  <a:srgbClr val="838787"/>
+                </a:solidFill>
+                <a:latin typeface="Avenir Next Medium"/>
+                <a:ea typeface="Avenir Next Medium"/>
+                <a:cs typeface="Avenir Next Medium"/>
+                <a:sym typeface="Avenir Next Medium"/>
+              </a:defRPr>
             </a:lvl1pPr>
           </a:lstStyle>
           <a:p>
-            <a:pPr algn="r"/>
-            <a:r>
-              <a:rPr lang="ja-JP" altLang="en-US" sz="9600" dirty="0">
-                <a:latin typeface="Meiryo UI" panose="020B0604030504040204" pitchFamily="50" charset="-128"/>
-                <a:ea typeface="Meiryo UI" panose="020B0604030504040204" pitchFamily="50" charset="-128"/>
-              </a:rPr>
-              <a:t>ログインページ</a:t>
-            </a:r>
-            <a:endParaRPr sz="9600" dirty="0">
-              <a:latin typeface="Meiryo UI" panose="020B0604030504040204" pitchFamily="50" charset="-128"/>
-              <a:ea typeface="Meiryo UI" panose="020B0604030504040204" pitchFamily="50" charset="-128"/>
-            </a:endParaRPr>
-          </a:p>
-        </p:txBody>
-      </p:sp>
-      <p:sp>
-        <p:nvSpPr>
-          <p:cNvPr id="359" name="動手做做看"/>
-          <p:cNvSpPr txBox="1">
-            <a:spLocks noGrp="1"/>
-          </p:cNvSpPr>
-          <p:nvPr>
-            <p:ph type="subTitle" sz="quarter" idx="1"/>
-          </p:nvPr>
-        </p:nvSpPr>
-        <p:spPr>
-          <a:prstGeom prst="rect">
-            <a:avLst/>
-          </a:prstGeom>
-        </p:spPr>
-        <p:txBody>
-          <a:bodyPr/>
-          <a:lstStyle/>
-          <a:p>
             <a:r>
               <a:rPr lang="ja-JP" altLang="en-US" dirty="0"/>
               <a:t>やってみよう！</a:t>
             </a:r>
-            <a:endParaRPr dirty="0"/>
-          </a:p>
-        </p:txBody>
-      </p:sp>
+            <a:r>
+              <a:rPr dirty="0"/>
+              <a:t>(template.html)</a:t>
+            </a:r>
+          </a:p>
+        </p:txBody>
+      </p:sp>
+      <p:pic>
+        <p:nvPicPr>
+          <p:cNvPr id="367" name="影像" descr="影像"/>
+          <p:cNvPicPr>
+            <a:picLocks noChangeAspect="1"/>
+          </p:cNvPicPr>
+          <p:nvPr/>
+        </p:nvPicPr>
+        <p:blipFill>
+          <a:blip r:embed="rId2"/>
+          <a:stretch>
+            <a:fillRect/>
+          </a:stretch>
+        </p:blipFill>
+        <p:spPr>
+          <a:xfrm>
+            <a:off x="605611" y="2333799"/>
+            <a:ext cx="11793578" cy="7370986"/>
+          </a:xfrm>
+          <a:prstGeom prst="rect">
+            <a:avLst/>
+          </a:prstGeom>
+          <a:ln w="12700">
+            <a:miter lim="400000"/>
+          </a:ln>
+        </p:spPr>
+      </p:pic>
     </p:spTree>
   </p:cSld>
   <p:clrMapOvr>
@@ -13251,7 +12977,7 @@
       </p:grpSpPr>
       <p:sp>
         <p:nvSpPr>
-          <p:cNvPr id="362" name="動手做做看"/>
+          <p:cNvPr id="370" name="動手做做看(template.html)"/>
           <p:cNvSpPr txBox="1">
             <a:spLocks noGrp="1"/>
           </p:cNvSpPr>
@@ -13267,31 +12993,36 @@
         <p:txBody>
           <a:bodyPr/>
           <a:lstStyle>
-            <a:lvl1pPr defTabSz="338835">
-              <a:spcBef>
-                <a:spcPts val="1600"/>
-              </a:spcBef>
-              <a:defRPr sz="3480"/>
+            <a:lvl1pPr>
+              <a:lnSpc>
+                <a:spcPct val="100000"/>
+              </a:lnSpc>
+              <a:defRPr sz="3400" b="0" cap="none">
+                <a:solidFill>
+                  <a:srgbClr val="838787"/>
+                </a:solidFill>
+                <a:latin typeface="Avenir Next Medium"/>
+                <a:ea typeface="Avenir Next Medium"/>
+                <a:cs typeface="Avenir Next Medium"/>
+                <a:sym typeface="Avenir Next Medium"/>
+              </a:defRPr>
             </a:lvl1pPr>
           </a:lstStyle>
           <a:p>
             <a:r>
-              <a:rPr lang="ja-JP" altLang="en-US" dirty="0">
-                <a:latin typeface="Meiryo UI" panose="020B0604030504040204" pitchFamily="50" charset="-128"/>
-                <a:ea typeface="Meiryo UI" panose="020B0604030504040204" pitchFamily="50" charset="-128"/>
-              </a:rPr>
+              <a:rPr lang="ja-JP" altLang="en-US" dirty="0"/>
               <a:t>やってみよう！</a:t>
             </a:r>
-            <a:endParaRPr dirty="0">
-              <a:latin typeface="Meiryo UI" panose="020B0604030504040204" pitchFamily="50" charset="-128"/>
-              <a:ea typeface="Meiryo UI" panose="020B0604030504040204" pitchFamily="50" charset="-128"/>
-            </a:endParaRPr>
+            <a:r>
+              <a:rPr dirty="0"/>
+              <a:t>(template.html)</a:t>
+            </a:r>
           </a:p>
         </p:txBody>
       </p:sp>
       <p:pic>
         <p:nvPicPr>
-          <p:cNvPr id="363" name="影像" descr="影像"/>
+          <p:cNvPr id="371" name="影像" descr="影像"/>
           <p:cNvPicPr>
             <a:picLocks noChangeAspect="1"/>
           </p:cNvPicPr>
@@ -13305,8 +13036,8 @@
         </p:blipFill>
         <p:spPr>
           <a:xfrm>
-            <a:off x="-1" y="2363706"/>
-            <a:ext cx="13004801" cy="7125547"/>
+            <a:off x="0" y="2245642"/>
+            <a:ext cx="13004801" cy="7116516"/>
           </a:xfrm>
           <a:prstGeom prst="rect">
             <a:avLst/>
@@ -13344,12 +13075,12 @@
       </p:grpSpPr>
       <p:sp>
         <p:nvSpPr>
-          <p:cNvPr id="366" name="動手做做看(template.html)"/>
+          <p:cNvPr id="373" name="畫面裡面的有什麼？"/>
           <p:cNvSpPr txBox="1">
             <a:spLocks noGrp="1"/>
           </p:cNvSpPr>
           <p:nvPr>
-            <p:ph type="title"/>
+            <p:ph type="ctrTitle"/>
           </p:nvPr>
         </p:nvSpPr>
         <p:spPr>
@@ -13358,62 +13089,86 @@
           </a:prstGeom>
         </p:spPr>
         <p:txBody>
+          <a:bodyPr>
+            <a:normAutofit/>
+          </a:bodyPr>
+          <a:lstStyle/>
+          <a:p>
+            <a:pPr algn="r" defTabSz="362204">
+              <a:defRPr sz="10540"/>
+            </a:pPr>
+            <a:r>
+              <a:rPr lang="ja-JP" altLang="en-US" sz="9600" dirty="0">
+                <a:latin typeface="Meiryo UI" panose="020B0604030504040204" pitchFamily="50" charset="-128"/>
+                <a:ea typeface="Meiryo UI" panose="020B0604030504040204" pitchFamily="50" charset="-128"/>
+              </a:rPr>
+              <a:t>画面に</a:t>
+            </a:r>
+            <a:r>
+              <a:rPr lang="ja-JP" altLang="en-US" sz="9600" dirty="0">
+                <a:solidFill>
+                  <a:schemeClr val="accent5">
+                    <a:hueOff val="343847"/>
+                    <a:satOff val="6318"/>
+                    <a:lumOff val="8159"/>
+                  </a:schemeClr>
+                </a:solidFill>
+                <a:latin typeface="Meiryo UI" panose="020B0604030504040204" pitchFamily="50" charset="-128"/>
+                <a:ea typeface="Meiryo UI" panose="020B0604030504040204" pitchFamily="50" charset="-128"/>
+              </a:rPr>
+              <a:t>何</a:t>
+            </a:r>
+            <a:r>
+              <a:rPr lang="ja-JP" altLang="en-US" sz="9600" dirty="0">
+                <a:latin typeface="Meiryo UI" panose="020B0604030504040204" pitchFamily="50" charset="-128"/>
+                <a:ea typeface="Meiryo UI" panose="020B0604030504040204" pitchFamily="50" charset="-128"/>
+              </a:rPr>
+              <a:t>がある</a:t>
+            </a:r>
+            <a:r>
+              <a:rPr sz="9600" dirty="0">
+                <a:latin typeface="Meiryo UI" panose="020B0604030504040204" pitchFamily="50" charset="-128"/>
+                <a:ea typeface="Meiryo UI" panose="020B0604030504040204" pitchFamily="50" charset="-128"/>
+              </a:rPr>
+              <a:t>？</a:t>
+            </a:r>
+          </a:p>
+        </p:txBody>
+      </p:sp>
+      <p:sp>
+        <p:nvSpPr>
+          <p:cNvPr id="374" name="問題六（3000will）"/>
+          <p:cNvSpPr txBox="1">
+            <a:spLocks noGrp="1"/>
+          </p:cNvSpPr>
+          <p:nvPr>
+            <p:ph type="subTitle" sz="quarter" idx="1"/>
+          </p:nvPr>
+        </p:nvSpPr>
+        <p:spPr>
+          <a:prstGeom prst="rect">
+            <a:avLst/>
+          </a:prstGeom>
+        </p:spPr>
+        <p:txBody>
           <a:bodyPr/>
-          <a:lstStyle>
-            <a:lvl1pPr>
-              <a:lnSpc>
-                <a:spcPct val="100000"/>
-              </a:lnSpc>
-              <a:defRPr sz="3400" b="0" cap="none">
-                <a:solidFill>
-                  <a:srgbClr val="838787"/>
-                </a:solidFill>
-                <a:latin typeface="Avenir Next Medium"/>
-                <a:ea typeface="Avenir Next Medium"/>
-                <a:cs typeface="Avenir Next Medium"/>
-                <a:sym typeface="Avenir Next Medium"/>
-              </a:defRPr>
-            </a:lvl1pPr>
-          </a:lstStyle>
-          <a:p>
-            <a:r>
-              <a:rPr lang="ja-JP" altLang="en-US" dirty="0"/>
-              <a:t>やってみよう！</a:t>
-            </a:r>
-            <a:r>
-              <a:rPr dirty="0"/>
-              <a:t>(template.html)</a:t>
-            </a:r>
-          </a:p>
-        </p:txBody>
-      </p:sp>
-      <p:pic>
-        <p:nvPicPr>
-          <p:cNvPr id="367" name="影像" descr="影像"/>
-          <p:cNvPicPr>
-            <a:picLocks noChangeAspect="1"/>
-          </p:cNvPicPr>
-          <p:nvPr/>
-        </p:nvPicPr>
-        <p:blipFill>
-          <a:blip r:embed="rId2"/>
-          <a:stretch>
-            <a:fillRect/>
-          </a:stretch>
-        </p:blipFill>
-        <p:spPr>
-          <a:xfrm>
-            <a:off x="605611" y="2333799"/>
-            <a:ext cx="11793578" cy="7370986"/>
-          </a:xfrm>
-          <a:prstGeom prst="rect">
-            <a:avLst/>
-          </a:prstGeom>
-          <a:ln w="12700">
-            <a:miter lim="400000"/>
-          </a:ln>
-        </p:spPr>
-      </p:pic>
+          <a:lstStyle/>
+          <a:p>
+            <a:r>
+              <a:rPr lang="ja-JP" altLang="en-US" sz="3400" dirty="0"/>
+              <a:t>クイズ </a:t>
+            </a:r>
+            <a:r>
+              <a:rPr lang="en-US" altLang="ja-JP" sz="3400" dirty="0"/>
+              <a:t>VI</a:t>
+            </a:r>
+            <a:r>
+              <a:rPr sz="3400" dirty="0"/>
+              <a:t>（3000will）</a:t>
+            </a:r>
+          </a:p>
+        </p:txBody>
+      </p:sp>
     </p:spTree>
   </p:cSld>
   <p:clrMapOvr>
@@ -13442,7 +13197,7 @@
       </p:grpSpPr>
       <p:sp>
         <p:nvSpPr>
-          <p:cNvPr id="370" name="動手做做看(template.html)"/>
+          <p:cNvPr id="377" name="畫面裡面有什麼？"/>
           <p:cNvSpPr txBox="1">
             <a:spLocks noGrp="1"/>
           </p:cNvSpPr>
@@ -13456,38 +13211,61 @@
           </a:prstGeom>
         </p:spPr>
         <p:txBody>
-          <a:bodyPr/>
-          <a:lstStyle>
-            <a:lvl1pPr>
-              <a:lnSpc>
-                <a:spcPct val="100000"/>
-              </a:lnSpc>
-              <a:defRPr sz="3400" b="0" cap="none">
-                <a:solidFill>
-                  <a:srgbClr val="838787"/>
-                </a:solidFill>
-                <a:latin typeface="Avenir Next Medium"/>
-                <a:ea typeface="Avenir Next Medium"/>
-                <a:cs typeface="Avenir Next Medium"/>
-                <a:sym typeface="Avenir Next Medium"/>
-              </a:defRPr>
-            </a:lvl1pPr>
-          </a:lstStyle>
-          <a:p>
-            <a:r>
-              <a:rPr lang="ja-JP" altLang="en-US" dirty="0"/>
-              <a:t>やってみよう！</a:t>
-            </a:r>
-            <a:r>
-              <a:rPr dirty="0"/>
-              <a:t>(template.html)</a:t>
-            </a:r>
+          <a:bodyPr>
+            <a:noAutofit/>
+          </a:bodyPr>
+          <a:lstStyle/>
+          <a:p>
+            <a:pPr defTabSz="338835">
+              <a:spcBef>
+                <a:spcPts val="1600"/>
+              </a:spcBef>
+              <a:defRPr sz="3480"/>
+            </a:pPr>
+            <a:r>
+              <a:rPr lang="ja-JP" altLang="en-US" sz="3600" dirty="0">
+                <a:solidFill>
+                  <a:srgbClr val="34A5DA"/>
+                </a:solidFill>
+                <a:latin typeface="Meiryo UI" panose="020B0604030504040204" pitchFamily="50" charset="-128"/>
+                <a:ea typeface="Meiryo UI" panose="020B0604030504040204" pitchFamily="50" charset="-128"/>
+              </a:rPr>
+              <a:t>画面に</a:t>
+            </a:r>
+            <a:r>
+              <a:rPr lang="ja-JP" altLang="en-US" sz="3600" dirty="0">
+                <a:solidFill>
+                  <a:srgbClr val="E42832">
+                    <a:hueOff val="343847"/>
+                    <a:satOff val="6318"/>
+                    <a:lumOff val="8159"/>
+                  </a:srgbClr>
+                </a:solidFill>
+                <a:latin typeface="Meiryo UI" panose="020B0604030504040204" pitchFamily="50" charset="-128"/>
+                <a:ea typeface="Meiryo UI" panose="020B0604030504040204" pitchFamily="50" charset="-128"/>
+              </a:rPr>
+              <a:t>何</a:t>
+            </a:r>
+            <a:r>
+              <a:rPr lang="ja-JP" altLang="en-US" sz="3600" dirty="0">
+                <a:solidFill>
+                  <a:srgbClr val="34A5DA"/>
+                </a:solidFill>
+                <a:latin typeface="Meiryo UI" panose="020B0604030504040204" pitchFamily="50" charset="-128"/>
+                <a:ea typeface="Meiryo UI" panose="020B0604030504040204" pitchFamily="50" charset="-128"/>
+              </a:rPr>
+              <a:t>がある？</a:t>
+            </a:r>
+            <a:endParaRPr sz="1600" dirty="0">
+              <a:latin typeface="Meiryo UI" panose="020B0604030504040204" pitchFamily="50" charset="-128"/>
+              <a:ea typeface="Meiryo UI" panose="020B0604030504040204" pitchFamily="50" charset="-128"/>
+            </a:endParaRPr>
           </a:p>
         </p:txBody>
       </p:sp>
       <p:pic>
         <p:nvPicPr>
-          <p:cNvPr id="371" name="影像" descr="影像"/>
+          <p:cNvPr id="378" name="影像" descr="影像"/>
           <p:cNvPicPr>
             <a:picLocks noChangeAspect="1"/>
           </p:cNvPicPr>
@@ -13501,8 +13279,8 @@
         </p:blipFill>
         <p:spPr>
           <a:xfrm>
-            <a:off x="0" y="2245642"/>
-            <a:ext cx="13004801" cy="7116516"/>
+            <a:off x="-1" y="2363706"/>
+            <a:ext cx="13004801" cy="7125547"/>
           </a:xfrm>
           <a:prstGeom prst="rect">
             <a:avLst/>
@@ -13512,6 +13290,342 @@
           </a:ln>
         </p:spPr>
       </p:pic>
+      <p:sp>
+        <p:nvSpPr>
+          <p:cNvPr id="379" name="矩形"/>
+          <p:cNvSpPr/>
+          <p:nvPr/>
+        </p:nvSpPr>
+        <p:spPr>
+          <a:xfrm>
+            <a:off x="6011869" y="3798320"/>
+            <a:ext cx="981062" cy="950815"/>
+          </a:xfrm>
+          <a:prstGeom prst="rect">
+            <a:avLst/>
+          </a:prstGeom>
+          <a:solidFill>
+            <a:srgbClr val="DAD023">
+              <a:alpha val="42886"/>
+            </a:srgbClr>
+          </a:solidFill>
+          <a:ln w="12700">
+            <a:miter lim="400000"/>
+          </a:ln>
+        </p:spPr>
+        <p:txBody>
+          <a:bodyPr lIns="50800" tIns="50800" rIns="50800" bIns="50800" anchor="ctr"/>
+          <a:lstStyle/>
+          <a:p>
+            <a:pPr algn="ctr">
+              <a:lnSpc>
+                <a:spcPct val="80000"/>
+              </a:lnSpc>
+              <a:spcBef>
+                <a:spcPts val="0"/>
+              </a:spcBef>
+              <a:defRPr sz="2800" b="1" cap="all">
+                <a:solidFill>
+                  <a:srgbClr val="FFFFFF"/>
+                </a:solidFill>
+                <a:latin typeface="+mn-lt"/>
+                <a:ea typeface="+mn-ea"/>
+                <a:cs typeface="+mn-cs"/>
+                <a:sym typeface="Baskerville"/>
+              </a:defRPr>
+            </a:pPr>
+            <a:endParaRPr/>
+          </a:p>
+        </p:txBody>
+      </p:sp>
+      <p:sp>
+        <p:nvSpPr>
+          <p:cNvPr id="380" name="矩形"/>
+          <p:cNvSpPr/>
+          <p:nvPr/>
+        </p:nvSpPr>
+        <p:spPr>
+          <a:xfrm>
+            <a:off x="5682213" y="4859644"/>
+            <a:ext cx="1640374" cy="295666"/>
+          </a:xfrm>
+          <a:prstGeom prst="rect">
+            <a:avLst/>
+          </a:prstGeom>
+          <a:solidFill>
+            <a:srgbClr val="8BDA83">
+              <a:alpha val="42886"/>
+            </a:srgbClr>
+          </a:solidFill>
+          <a:ln w="12700">
+            <a:miter lim="400000"/>
+          </a:ln>
+        </p:spPr>
+        <p:txBody>
+          <a:bodyPr lIns="50800" tIns="50800" rIns="50800" bIns="50800" anchor="ctr"/>
+          <a:lstStyle/>
+          <a:p>
+            <a:pPr algn="ctr">
+              <a:lnSpc>
+                <a:spcPct val="80000"/>
+              </a:lnSpc>
+              <a:spcBef>
+                <a:spcPts val="0"/>
+              </a:spcBef>
+              <a:defRPr sz="2800" b="1" cap="all">
+                <a:solidFill>
+                  <a:srgbClr val="FFFFFF"/>
+                </a:solidFill>
+                <a:latin typeface="+mn-lt"/>
+                <a:ea typeface="+mn-ea"/>
+                <a:cs typeface="+mn-cs"/>
+                <a:sym typeface="Baskerville"/>
+              </a:defRPr>
+            </a:pPr>
+            <a:endParaRPr/>
+          </a:p>
+        </p:txBody>
+      </p:sp>
+      <p:sp>
+        <p:nvSpPr>
+          <p:cNvPr id="381" name="矩形"/>
+          <p:cNvSpPr/>
+          <p:nvPr/>
+        </p:nvSpPr>
+        <p:spPr>
+          <a:xfrm>
+            <a:off x="5106879" y="5265819"/>
+            <a:ext cx="2791042" cy="520701"/>
+          </a:xfrm>
+          <a:prstGeom prst="rect">
+            <a:avLst/>
+          </a:prstGeom>
+          <a:solidFill>
+            <a:srgbClr val="A222DA">
+              <a:alpha val="42886"/>
+            </a:srgbClr>
+          </a:solidFill>
+          <a:ln w="12700">
+            <a:miter lim="400000"/>
+          </a:ln>
+        </p:spPr>
+        <p:txBody>
+          <a:bodyPr lIns="50800" tIns="50800" rIns="50800" bIns="50800" anchor="ctr"/>
+          <a:lstStyle/>
+          <a:p>
+            <a:pPr algn="ctr">
+              <a:lnSpc>
+                <a:spcPct val="80000"/>
+              </a:lnSpc>
+              <a:spcBef>
+                <a:spcPts val="0"/>
+              </a:spcBef>
+              <a:defRPr sz="2800" b="1" cap="all">
+                <a:solidFill>
+                  <a:srgbClr val="FFFFFF"/>
+                </a:solidFill>
+                <a:latin typeface="+mn-lt"/>
+                <a:ea typeface="+mn-ea"/>
+                <a:cs typeface="+mn-cs"/>
+                <a:sym typeface="Baskerville"/>
+              </a:defRPr>
+            </a:pPr>
+            <a:endParaRPr/>
+          </a:p>
+        </p:txBody>
+      </p:sp>
+      <p:sp>
+        <p:nvSpPr>
+          <p:cNvPr id="382" name="矩形"/>
+          <p:cNvSpPr/>
+          <p:nvPr/>
+        </p:nvSpPr>
+        <p:spPr>
+          <a:xfrm>
+            <a:off x="5106938" y="5778646"/>
+            <a:ext cx="2790924" cy="402181"/>
+          </a:xfrm>
+          <a:prstGeom prst="rect">
+            <a:avLst/>
+          </a:prstGeom>
+          <a:solidFill>
+            <a:srgbClr val="DA311B">
+              <a:alpha val="42886"/>
+            </a:srgbClr>
+          </a:solidFill>
+          <a:ln w="12700">
+            <a:miter lim="400000"/>
+          </a:ln>
+        </p:spPr>
+        <p:txBody>
+          <a:bodyPr lIns="50800" tIns="50800" rIns="50800" bIns="50800" anchor="ctr"/>
+          <a:lstStyle/>
+          <a:p>
+            <a:pPr algn="ctr">
+              <a:lnSpc>
+                <a:spcPct val="80000"/>
+              </a:lnSpc>
+              <a:spcBef>
+                <a:spcPts val="0"/>
+              </a:spcBef>
+              <a:defRPr sz="2800" b="1" cap="all">
+                <a:solidFill>
+                  <a:srgbClr val="FFFFFF"/>
+                </a:solidFill>
+                <a:latin typeface="+mn-lt"/>
+                <a:ea typeface="+mn-ea"/>
+                <a:cs typeface="+mn-cs"/>
+                <a:sym typeface="Baskerville"/>
+              </a:defRPr>
+            </a:pPr>
+            <a:endParaRPr/>
+          </a:p>
+        </p:txBody>
+      </p:sp>
+      <p:sp>
+        <p:nvSpPr>
+          <p:cNvPr id="383" name="矩形"/>
+          <p:cNvSpPr/>
+          <p:nvPr/>
+        </p:nvSpPr>
+        <p:spPr>
+          <a:xfrm>
+            <a:off x="5894916" y="6203892"/>
+            <a:ext cx="1214968" cy="295666"/>
+          </a:xfrm>
+          <a:prstGeom prst="rect">
+            <a:avLst/>
+          </a:prstGeom>
+          <a:solidFill>
+            <a:srgbClr val="7EDACE">
+              <a:alpha val="42886"/>
+            </a:srgbClr>
+          </a:solidFill>
+          <a:ln w="12700">
+            <a:miter lim="400000"/>
+          </a:ln>
+        </p:spPr>
+        <p:txBody>
+          <a:bodyPr lIns="50800" tIns="50800" rIns="50800" bIns="50800" anchor="ctr"/>
+          <a:lstStyle/>
+          <a:p>
+            <a:pPr algn="ctr">
+              <a:lnSpc>
+                <a:spcPct val="80000"/>
+              </a:lnSpc>
+              <a:spcBef>
+                <a:spcPts val="0"/>
+              </a:spcBef>
+              <a:defRPr sz="2800" b="1" cap="all">
+                <a:solidFill>
+                  <a:srgbClr val="FFFFFF"/>
+                </a:solidFill>
+                <a:latin typeface="+mn-lt"/>
+                <a:ea typeface="+mn-ea"/>
+                <a:cs typeface="+mn-cs"/>
+                <a:sym typeface="Baskerville"/>
+              </a:defRPr>
+            </a:pPr>
+            <a:endParaRPr/>
+          </a:p>
+        </p:txBody>
+      </p:sp>
+      <p:sp>
+        <p:nvSpPr>
+          <p:cNvPr id="384" name="矩形"/>
+          <p:cNvSpPr/>
+          <p:nvPr/>
+        </p:nvSpPr>
+        <p:spPr>
+          <a:xfrm>
+            <a:off x="6004731" y="7490531"/>
+            <a:ext cx="995338" cy="295666"/>
+          </a:xfrm>
+          <a:prstGeom prst="rect">
+            <a:avLst/>
+          </a:prstGeom>
+          <a:solidFill>
+            <a:srgbClr val="DA8216">
+              <a:alpha val="42886"/>
+            </a:srgbClr>
+          </a:solidFill>
+          <a:ln w="12700">
+            <a:miter lim="400000"/>
+          </a:ln>
+        </p:spPr>
+        <p:txBody>
+          <a:bodyPr lIns="50800" tIns="50800" rIns="50800" bIns="50800" anchor="ctr"/>
+          <a:lstStyle/>
+          <a:p>
+            <a:pPr algn="ctr">
+              <a:lnSpc>
+                <a:spcPct val="80000"/>
+              </a:lnSpc>
+              <a:spcBef>
+                <a:spcPts val="0"/>
+              </a:spcBef>
+              <a:defRPr sz="2800" b="1" cap="all">
+                <a:solidFill>
+                  <a:srgbClr val="FFFFFF"/>
+                </a:solidFill>
+                <a:latin typeface="+mn-lt"/>
+                <a:ea typeface="+mn-ea"/>
+                <a:cs typeface="+mn-cs"/>
+                <a:sym typeface="Baskerville"/>
+              </a:defRPr>
+            </a:pPr>
+            <a:endParaRPr/>
+          </a:p>
+        </p:txBody>
+      </p:sp>
+      <p:sp>
+        <p:nvSpPr>
+          <p:cNvPr id="385" name="矩形"/>
+          <p:cNvSpPr/>
+          <p:nvPr/>
+        </p:nvSpPr>
+        <p:spPr>
+          <a:xfrm>
+            <a:off x="5050307" y="6536377"/>
+            <a:ext cx="2904186" cy="647250"/>
+          </a:xfrm>
+          <a:prstGeom prst="rect">
+            <a:avLst/>
+          </a:prstGeom>
+          <a:solidFill>
+            <a:srgbClr val="3B38DA">
+              <a:alpha val="42886"/>
+            </a:srgbClr>
+          </a:solidFill>
+          <a:ln w="12700">
+            <a:miter lim="400000"/>
+          </a:ln>
+        </p:spPr>
+        <p:txBody>
+          <a:bodyPr lIns="50800" tIns="50800" rIns="50800" bIns="50800" anchor="ctr"/>
+          <a:lstStyle/>
+          <a:p>
+            <a:pPr algn="ctr">
+              <a:lnSpc>
+                <a:spcPct val="80000"/>
+              </a:lnSpc>
+              <a:spcBef>
+                <a:spcPts val="0"/>
+              </a:spcBef>
+              <a:defRPr sz="2800" b="1" cap="all">
+                <a:solidFill>
+                  <a:srgbClr val="FFFFFF"/>
+                </a:solidFill>
+                <a:latin typeface="+mn-lt"/>
+                <a:ea typeface="+mn-ea"/>
+                <a:cs typeface="+mn-cs"/>
+                <a:sym typeface="Baskerville"/>
+              </a:defRPr>
+            </a:pPr>
+            <a:endParaRPr/>
+          </a:p>
+        </p:txBody>
+      </p:sp>
     </p:spTree>
   </p:cSld>
   <p:clrMapOvr>
@@ -13540,12 +13654,12 @@
       </p:grpSpPr>
       <p:sp>
         <p:nvSpPr>
-          <p:cNvPr id="373" name="畫面裡面的有什麼？"/>
+          <p:cNvPr id="387" name="直接在網頁找…"/>
           <p:cNvSpPr txBox="1">
             <a:spLocks noGrp="1"/>
           </p:cNvSpPr>
           <p:nvPr>
-            <p:ph type="ctrTitle"/>
+            <p:ph type="title"/>
           </p:nvPr>
         </p:nvSpPr>
         <p:spPr>
@@ -13555,82 +13669,53 @@
         </p:spPr>
         <p:txBody>
           <a:bodyPr>
-            <a:normAutofit/>
+            <a:noAutofit/>
           </a:bodyPr>
           <a:lstStyle/>
           <a:p>
-            <a:pPr algn="r" defTabSz="362204">
-              <a:defRPr sz="10540"/>
+            <a:pPr>
+              <a:defRPr sz="10000"/>
             </a:pPr>
             <a:r>
-              <a:rPr lang="ja-JP" altLang="en-US" sz="9600" dirty="0">
+              <a:rPr lang="en-US" altLang="zh-TW" sz="8000" dirty="0">
                 <a:latin typeface="Meiryo UI" panose="020B0604030504040204" pitchFamily="50" charset="-128"/>
                 <a:ea typeface="Meiryo UI" panose="020B0604030504040204" pitchFamily="50" charset="-128"/>
               </a:rPr>
-              <a:t>画面に</a:t>
-            </a:r>
-            <a:r>
-              <a:rPr lang="ja-JP" altLang="en-US" sz="9600" dirty="0">
-                <a:solidFill>
-                  <a:schemeClr val="accent5">
-                    <a:hueOff val="343847"/>
-                    <a:satOff val="6318"/>
-                    <a:lumOff val="8159"/>
-                  </a:schemeClr>
-                </a:solidFill>
+              <a:t>Bootstrap</a:t>
+            </a:r>
+            <a:r>
+              <a:rPr lang="ja-JP" altLang="en-US" sz="8000" dirty="0">
                 <a:latin typeface="Meiryo UI" panose="020B0604030504040204" pitchFamily="50" charset="-128"/>
                 <a:ea typeface="Meiryo UI" panose="020B0604030504040204" pitchFamily="50" charset="-128"/>
               </a:rPr>
-              <a:t>何</a:t>
-            </a:r>
-            <a:r>
-              <a:rPr lang="ja-JP" altLang="en-US" sz="9600" dirty="0">
+              <a:t>のサイトで</a:t>
+            </a:r>
+            <a:br>
+              <a:rPr lang="en-US" altLang="ja-JP" sz="8000" dirty="0">
                 <a:latin typeface="Meiryo UI" panose="020B0604030504040204" pitchFamily="50" charset="-128"/>
                 <a:ea typeface="Meiryo UI" panose="020B0604030504040204" pitchFamily="50" charset="-128"/>
               </a:rPr>
-              <a:t>がある</a:t>
-            </a:r>
-            <a:r>
-              <a:rPr sz="9600" dirty="0">
+            </a:br>
+            <a:endParaRPr lang="zh-TW" altLang="en-US" sz="6000" dirty="0">
+              <a:latin typeface="Meiryo UI" panose="020B0604030504040204" pitchFamily="50" charset="-128"/>
+              <a:ea typeface="Meiryo UI" panose="020B0604030504040204" pitchFamily="50" charset="-128"/>
+            </a:endParaRPr>
+          </a:p>
+          <a:p>
+            <a:pPr algn="r">
+              <a:defRPr sz="15000"/>
+            </a:pPr>
+            <a:r>
+              <a:rPr lang="ja-JP" altLang="en-US" sz="7200" dirty="0">
                 <a:latin typeface="Meiryo UI" panose="020B0604030504040204" pitchFamily="50" charset="-128"/>
                 <a:ea typeface="Meiryo UI" panose="020B0604030504040204" pitchFamily="50" charset="-128"/>
               </a:rPr>
-              <a:t>？</a:t>
-            </a:r>
-          </a:p>
-        </p:txBody>
-      </p:sp>
-      <p:sp>
-        <p:nvSpPr>
-          <p:cNvPr id="374" name="問題六（3000will）"/>
-          <p:cNvSpPr txBox="1">
-            <a:spLocks noGrp="1"/>
-          </p:cNvSpPr>
-          <p:nvPr>
-            <p:ph type="subTitle" sz="quarter" idx="1"/>
-          </p:nvPr>
-        </p:nvSpPr>
-        <p:spPr>
-          <a:prstGeom prst="rect">
-            <a:avLst/>
-          </a:prstGeom>
-        </p:spPr>
-        <p:txBody>
-          <a:bodyPr/>
-          <a:lstStyle/>
-          <a:p>
-            <a:r>
-              <a:rPr lang="ja-JP" altLang="en-US" sz="3400" dirty="0"/>
-              <a:t>クイズ </a:t>
-            </a:r>
-            <a:r>
-              <a:rPr lang="en-US" altLang="ja-JP" sz="3400" dirty="0"/>
-              <a:t>VI</a:t>
-            </a:r>
-            <a:r>
-              <a:rPr sz="3400" dirty="0"/>
-              <a:t>（3000will）</a:t>
-            </a:r>
+              <a:t>使えそうな部品を見つけよう！</a:t>
+            </a:r>
+            <a:endParaRPr lang="zh-TW" altLang="en-US" sz="7200" dirty="0">
+              <a:latin typeface="Meiryo UI" panose="020B0604030504040204" pitchFamily="50" charset="-128"/>
+              <a:ea typeface="Meiryo UI" panose="020B0604030504040204" pitchFamily="50" charset="-128"/>
+            </a:endParaRPr>
           </a:p>
         </p:txBody>
       </p:sp>
@@ -13644,649 +13729,6 @@
 </file>
 
 <file path=ppt/slides/slide48.xml><?xml version="1.0" encoding="utf-8"?>
-<p:sld xmlns:a="http://schemas.openxmlformats.org/drawingml/2006/main" xmlns:r="http://schemas.openxmlformats.org/officeDocument/2006/relationships" xmlns:p="http://schemas.openxmlformats.org/presentationml/2006/main">
-  <p:cSld>
-    <p:spTree>
-      <p:nvGrpSpPr>
-        <p:cNvPr id="1" name=""/>
-        <p:cNvGrpSpPr/>
-        <p:nvPr/>
-      </p:nvGrpSpPr>
-      <p:grpSpPr>
-        <a:xfrm>
-          <a:off x="0" y="0"/>
-          <a:ext cx="0" cy="0"/>
-          <a:chOff x="0" y="0"/>
-          <a:chExt cx="0" cy="0"/>
-        </a:xfrm>
-      </p:grpSpPr>
-      <p:sp>
-        <p:nvSpPr>
-          <p:cNvPr id="377" name="畫面裡面有什麼？"/>
-          <p:cNvSpPr txBox="1">
-            <a:spLocks noGrp="1"/>
-          </p:cNvSpPr>
-          <p:nvPr>
-            <p:ph type="title"/>
-          </p:nvPr>
-        </p:nvSpPr>
-        <p:spPr>
-          <a:prstGeom prst="rect">
-            <a:avLst/>
-          </a:prstGeom>
-        </p:spPr>
-        <p:txBody>
-          <a:bodyPr>
-            <a:noAutofit/>
-          </a:bodyPr>
-          <a:lstStyle/>
-          <a:p>
-            <a:pPr defTabSz="338835">
-              <a:spcBef>
-                <a:spcPts val="1600"/>
-              </a:spcBef>
-              <a:defRPr sz="3480"/>
-            </a:pPr>
-            <a:r>
-              <a:rPr lang="ja-JP" altLang="en-US" sz="3600" dirty="0">
-                <a:solidFill>
-                  <a:srgbClr val="34A5DA"/>
-                </a:solidFill>
-                <a:latin typeface="Meiryo UI" panose="020B0604030504040204" pitchFamily="50" charset="-128"/>
-                <a:ea typeface="Meiryo UI" panose="020B0604030504040204" pitchFamily="50" charset="-128"/>
-              </a:rPr>
-              <a:t>画面に</a:t>
-            </a:r>
-            <a:r>
-              <a:rPr lang="ja-JP" altLang="en-US" sz="3600" dirty="0">
-                <a:solidFill>
-                  <a:srgbClr val="E42832">
-                    <a:hueOff val="343847"/>
-                    <a:satOff val="6318"/>
-                    <a:lumOff val="8159"/>
-                  </a:srgbClr>
-                </a:solidFill>
-                <a:latin typeface="Meiryo UI" panose="020B0604030504040204" pitchFamily="50" charset="-128"/>
-                <a:ea typeface="Meiryo UI" panose="020B0604030504040204" pitchFamily="50" charset="-128"/>
-              </a:rPr>
-              <a:t>何</a:t>
-            </a:r>
-            <a:r>
-              <a:rPr lang="ja-JP" altLang="en-US" sz="3600" dirty="0">
-                <a:solidFill>
-                  <a:srgbClr val="34A5DA"/>
-                </a:solidFill>
-                <a:latin typeface="Meiryo UI" panose="020B0604030504040204" pitchFamily="50" charset="-128"/>
-                <a:ea typeface="Meiryo UI" panose="020B0604030504040204" pitchFamily="50" charset="-128"/>
-              </a:rPr>
-              <a:t>がある？</a:t>
-            </a:r>
-            <a:endParaRPr sz="1600" dirty="0">
-              <a:latin typeface="Meiryo UI" panose="020B0604030504040204" pitchFamily="50" charset="-128"/>
-              <a:ea typeface="Meiryo UI" panose="020B0604030504040204" pitchFamily="50" charset="-128"/>
-            </a:endParaRPr>
-          </a:p>
-        </p:txBody>
-      </p:sp>
-      <p:pic>
-        <p:nvPicPr>
-          <p:cNvPr id="378" name="影像" descr="影像"/>
-          <p:cNvPicPr>
-            <a:picLocks noChangeAspect="1"/>
-          </p:cNvPicPr>
-          <p:nvPr/>
-        </p:nvPicPr>
-        <p:blipFill>
-          <a:blip r:embed="rId2"/>
-          <a:stretch>
-            <a:fillRect/>
-          </a:stretch>
-        </p:blipFill>
-        <p:spPr>
-          <a:xfrm>
-            <a:off x="-1" y="2363706"/>
-            <a:ext cx="13004801" cy="7125547"/>
-          </a:xfrm>
-          <a:prstGeom prst="rect">
-            <a:avLst/>
-          </a:prstGeom>
-          <a:ln w="12700">
-            <a:miter lim="400000"/>
-          </a:ln>
-        </p:spPr>
-      </p:pic>
-      <p:sp>
-        <p:nvSpPr>
-          <p:cNvPr id="379" name="矩形"/>
-          <p:cNvSpPr/>
-          <p:nvPr/>
-        </p:nvSpPr>
-        <p:spPr>
-          <a:xfrm>
-            <a:off x="6011869" y="3798320"/>
-            <a:ext cx="981062" cy="950815"/>
-          </a:xfrm>
-          <a:prstGeom prst="rect">
-            <a:avLst/>
-          </a:prstGeom>
-          <a:solidFill>
-            <a:srgbClr val="DAD023">
-              <a:alpha val="42886"/>
-            </a:srgbClr>
-          </a:solidFill>
-          <a:ln w="12700">
-            <a:miter lim="400000"/>
-          </a:ln>
-        </p:spPr>
-        <p:txBody>
-          <a:bodyPr lIns="50800" tIns="50800" rIns="50800" bIns="50800" anchor="ctr"/>
-          <a:lstStyle/>
-          <a:p>
-            <a:pPr algn="ctr">
-              <a:lnSpc>
-                <a:spcPct val="80000"/>
-              </a:lnSpc>
-              <a:spcBef>
-                <a:spcPts val="0"/>
-              </a:spcBef>
-              <a:defRPr sz="2800" b="1" cap="all">
-                <a:solidFill>
-                  <a:srgbClr val="FFFFFF"/>
-                </a:solidFill>
-                <a:latin typeface="+mn-lt"/>
-                <a:ea typeface="+mn-ea"/>
-                <a:cs typeface="+mn-cs"/>
-                <a:sym typeface="Baskerville"/>
-              </a:defRPr>
-            </a:pPr>
-            <a:endParaRPr/>
-          </a:p>
-        </p:txBody>
-      </p:sp>
-      <p:sp>
-        <p:nvSpPr>
-          <p:cNvPr id="380" name="矩形"/>
-          <p:cNvSpPr/>
-          <p:nvPr/>
-        </p:nvSpPr>
-        <p:spPr>
-          <a:xfrm>
-            <a:off x="5682213" y="4859644"/>
-            <a:ext cx="1640374" cy="295666"/>
-          </a:xfrm>
-          <a:prstGeom prst="rect">
-            <a:avLst/>
-          </a:prstGeom>
-          <a:solidFill>
-            <a:srgbClr val="8BDA83">
-              <a:alpha val="42886"/>
-            </a:srgbClr>
-          </a:solidFill>
-          <a:ln w="12700">
-            <a:miter lim="400000"/>
-          </a:ln>
-        </p:spPr>
-        <p:txBody>
-          <a:bodyPr lIns="50800" tIns="50800" rIns="50800" bIns="50800" anchor="ctr"/>
-          <a:lstStyle/>
-          <a:p>
-            <a:pPr algn="ctr">
-              <a:lnSpc>
-                <a:spcPct val="80000"/>
-              </a:lnSpc>
-              <a:spcBef>
-                <a:spcPts val="0"/>
-              </a:spcBef>
-              <a:defRPr sz="2800" b="1" cap="all">
-                <a:solidFill>
-                  <a:srgbClr val="FFFFFF"/>
-                </a:solidFill>
-                <a:latin typeface="+mn-lt"/>
-                <a:ea typeface="+mn-ea"/>
-                <a:cs typeface="+mn-cs"/>
-                <a:sym typeface="Baskerville"/>
-              </a:defRPr>
-            </a:pPr>
-            <a:endParaRPr/>
-          </a:p>
-        </p:txBody>
-      </p:sp>
-      <p:sp>
-        <p:nvSpPr>
-          <p:cNvPr id="381" name="矩形"/>
-          <p:cNvSpPr/>
-          <p:nvPr/>
-        </p:nvSpPr>
-        <p:spPr>
-          <a:xfrm>
-            <a:off x="5106879" y="5265819"/>
-            <a:ext cx="2791042" cy="520701"/>
-          </a:xfrm>
-          <a:prstGeom prst="rect">
-            <a:avLst/>
-          </a:prstGeom>
-          <a:solidFill>
-            <a:srgbClr val="A222DA">
-              <a:alpha val="42886"/>
-            </a:srgbClr>
-          </a:solidFill>
-          <a:ln w="12700">
-            <a:miter lim="400000"/>
-          </a:ln>
-        </p:spPr>
-        <p:txBody>
-          <a:bodyPr lIns="50800" tIns="50800" rIns="50800" bIns="50800" anchor="ctr"/>
-          <a:lstStyle/>
-          <a:p>
-            <a:pPr algn="ctr">
-              <a:lnSpc>
-                <a:spcPct val="80000"/>
-              </a:lnSpc>
-              <a:spcBef>
-                <a:spcPts val="0"/>
-              </a:spcBef>
-              <a:defRPr sz="2800" b="1" cap="all">
-                <a:solidFill>
-                  <a:srgbClr val="FFFFFF"/>
-                </a:solidFill>
-                <a:latin typeface="+mn-lt"/>
-                <a:ea typeface="+mn-ea"/>
-                <a:cs typeface="+mn-cs"/>
-                <a:sym typeface="Baskerville"/>
-              </a:defRPr>
-            </a:pPr>
-            <a:endParaRPr/>
-          </a:p>
-        </p:txBody>
-      </p:sp>
-      <p:sp>
-        <p:nvSpPr>
-          <p:cNvPr id="382" name="矩形"/>
-          <p:cNvSpPr/>
-          <p:nvPr/>
-        </p:nvSpPr>
-        <p:spPr>
-          <a:xfrm>
-            <a:off x="5106938" y="5778646"/>
-            <a:ext cx="2790924" cy="402181"/>
-          </a:xfrm>
-          <a:prstGeom prst="rect">
-            <a:avLst/>
-          </a:prstGeom>
-          <a:solidFill>
-            <a:srgbClr val="DA311B">
-              <a:alpha val="42886"/>
-            </a:srgbClr>
-          </a:solidFill>
-          <a:ln w="12700">
-            <a:miter lim="400000"/>
-          </a:ln>
-        </p:spPr>
-        <p:txBody>
-          <a:bodyPr lIns="50800" tIns="50800" rIns="50800" bIns="50800" anchor="ctr"/>
-          <a:lstStyle/>
-          <a:p>
-            <a:pPr algn="ctr">
-              <a:lnSpc>
-                <a:spcPct val="80000"/>
-              </a:lnSpc>
-              <a:spcBef>
-                <a:spcPts val="0"/>
-              </a:spcBef>
-              <a:defRPr sz="2800" b="1" cap="all">
-                <a:solidFill>
-                  <a:srgbClr val="FFFFFF"/>
-                </a:solidFill>
-                <a:latin typeface="+mn-lt"/>
-                <a:ea typeface="+mn-ea"/>
-                <a:cs typeface="+mn-cs"/>
-                <a:sym typeface="Baskerville"/>
-              </a:defRPr>
-            </a:pPr>
-            <a:endParaRPr/>
-          </a:p>
-        </p:txBody>
-      </p:sp>
-      <p:sp>
-        <p:nvSpPr>
-          <p:cNvPr id="383" name="矩形"/>
-          <p:cNvSpPr/>
-          <p:nvPr/>
-        </p:nvSpPr>
-        <p:spPr>
-          <a:xfrm>
-            <a:off x="5894916" y="6203892"/>
-            <a:ext cx="1214968" cy="295666"/>
-          </a:xfrm>
-          <a:prstGeom prst="rect">
-            <a:avLst/>
-          </a:prstGeom>
-          <a:solidFill>
-            <a:srgbClr val="7EDACE">
-              <a:alpha val="42886"/>
-            </a:srgbClr>
-          </a:solidFill>
-          <a:ln w="12700">
-            <a:miter lim="400000"/>
-          </a:ln>
-        </p:spPr>
-        <p:txBody>
-          <a:bodyPr lIns="50800" tIns="50800" rIns="50800" bIns="50800" anchor="ctr"/>
-          <a:lstStyle/>
-          <a:p>
-            <a:pPr algn="ctr">
-              <a:lnSpc>
-                <a:spcPct val="80000"/>
-              </a:lnSpc>
-              <a:spcBef>
-                <a:spcPts val="0"/>
-              </a:spcBef>
-              <a:defRPr sz="2800" b="1" cap="all">
-                <a:solidFill>
-                  <a:srgbClr val="FFFFFF"/>
-                </a:solidFill>
-                <a:latin typeface="+mn-lt"/>
-                <a:ea typeface="+mn-ea"/>
-                <a:cs typeface="+mn-cs"/>
-                <a:sym typeface="Baskerville"/>
-              </a:defRPr>
-            </a:pPr>
-            <a:endParaRPr/>
-          </a:p>
-        </p:txBody>
-      </p:sp>
-      <p:sp>
-        <p:nvSpPr>
-          <p:cNvPr id="384" name="矩形"/>
-          <p:cNvSpPr/>
-          <p:nvPr/>
-        </p:nvSpPr>
-        <p:spPr>
-          <a:xfrm>
-            <a:off x="6004731" y="7490531"/>
-            <a:ext cx="995338" cy="295666"/>
-          </a:xfrm>
-          <a:prstGeom prst="rect">
-            <a:avLst/>
-          </a:prstGeom>
-          <a:solidFill>
-            <a:srgbClr val="DA8216">
-              <a:alpha val="42886"/>
-            </a:srgbClr>
-          </a:solidFill>
-          <a:ln w="12700">
-            <a:miter lim="400000"/>
-          </a:ln>
-        </p:spPr>
-        <p:txBody>
-          <a:bodyPr lIns="50800" tIns="50800" rIns="50800" bIns="50800" anchor="ctr"/>
-          <a:lstStyle/>
-          <a:p>
-            <a:pPr algn="ctr">
-              <a:lnSpc>
-                <a:spcPct val="80000"/>
-              </a:lnSpc>
-              <a:spcBef>
-                <a:spcPts val="0"/>
-              </a:spcBef>
-              <a:defRPr sz="2800" b="1" cap="all">
-                <a:solidFill>
-                  <a:srgbClr val="FFFFFF"/>
-                </a:solidFill>
-                <a:latin typeface="+mn-lt"/>
-                <a:ea typeface="+mn-ea"/>
-                <a:cs typeface="+mn-cs"/>
-                <a:sym typeface="Baskerville"/>
-              </a:defRPr>
-            </a:pPr>
-            <a:endParaRPr/>
-          </a:p>
-        </p:txBody>
-      </p:sp>
-      <p:sp>
-        <p:nvSpPr>
-          <p:cNvPr id="385" name="矩形"/>
-          <p:cNvSpPr/>
-          <p:nvPr/>
-        </p:nvSpPr>
-        <p:spPr>
-          <a:xfrm>
-            <a:off x="5050307" y="6536377"/>
-            <a:ext cx="2904186" cy="647250"/>
-          </a:xfrm>
-          <a:prstGeom prst="rect">
-            <a:avLst/>
-          </a:prstGeom>
-          <a:solidFill>
-            <a:srgbClr val="3B38DA">
-              <a:alpha val="42886"/>
-            </a:srgbClr>
-          </a:solidFill>
-          <a:ln w="12700">
-            <a:miter lim="400000"/>
-          </a:ln>
-        </p:spPr>
-        <p:txBody>
-          <a:bodyPr lIns="50800" tIns="50800" rIns="50800" bIns="50800" anchor="ctr"/>
-          <a:lstStyle/>
-          <a:p>
-            <a:pPr algn="ctr">
-              <a:lnSpc>
-                <a:spcPct val="80000"/>
-              </a:lnSpc>
-              <a:spcBef>
-                <a:spcPts val="0"/>
-              </a:spcBef>
-              <a:defRPr sz="2800" b="1" cap="all">
-                <a:solidFill>
-                  <a:srgbClr val="FFFFFF"/>
-                </a:solidFill>
-                <a:latin typeface="+mn-lt"/>
-                <a:ea typeface="+mn-ea"/>
-                <a:cs typeface="+mn-cs"/>
-                <a:sym typeface="Baskerville"/>
-              </a:defRPr>
-            </a:pPr>
-            <a:endParaRPr/>
-          </a:p>
-        </p:txBody>
-      </p:sp>
-    </p:spTree>
-  </p:cSld>
-  <p:clrMapOvr>
-    <a:masterClrMapping/>
-  </p:clrMapOvr>
-  <p:transition spd="med"/>
-</p:sld>
-</file>
-
-<file path=ppt/slides/slide49.xml><?xml version="1.0" encoding="utf-8"?>
-<p:sld xmlns:a="http://schemas.openxmlformats.org/drawingml/2006/main" xmlns:r="http://schemas.openxmlformats.org/officeDocument/2006/relationships" xmlns:p="http://schemas.openxmlformats.org/presentationml/2006/main">
-  <p:cSld>
-    <p:spTree>
-      <p:nvGrpSpPr>
-        <p:cNvPr id="1" name=""/>
-        <p:cNvGrpSpPr/>
-        <p:nvPr/>
-      </p:nvGrpSpPr>
-      <p:grpSpPr>
-        <a:xfrm>
-          <a:off x="0" y="0"/>
-          <a:ext cx="0" cy="0"/>
-          <a:chOff x="0" y="0"/>
-          <a:chExt cx="0" cy="0"/>
-        </a:xfrm>
-      </p:grpSpPr>
-      <p:sp>
-        <p:nvSpPr>
-          <p:cNvPr id="387" name="直接在網頁找…"/>
-          <p:cNvSpPr txBox="1">
-            <a:spLocks noGrp="1"/>
-          </p:cNvSpPr>
-          <p:nvPr>
-            <p:ph type="title"/>
-          </p:nvPr>
-        </p:nvSpPr>
-        <p:spPr>
-          <a:prstGeom prst="rect">
-            <a:avLst/>
-          </a:prstGeom>
-        </p:spPr>
-        <p:txBody>
-          <a:bodyPr>
-            <a:noAutofit/>
-          </a:bodyPr>
-          <a:lstStyle/>
-          <a:p>
-            <a:pPr>
-              <a:defRPr sz="10000"/>
-            </a:pPr>
-            <a:r>
-              <a:rPr lang="en-US" altLang="zh-TW" sz="8000" dirty="0">
-                <a:latin typeface="Meiryo UI" panose="020B0604030504040204" pitchFamily="50" charset="-128"/>
-                <a:ea typeface="Meiryo UI" panose="020B0604030504040204" pitchFamily="50" charset="-128"/>
-              </a:rPr>
-              <a:t>Bootstrap</a:t>
-            </a:r>
-            <a:r>
-              <a:rPr lang="ja-JP" altLang="en-US" sz="8000" dirty="0">
-                <a:latin typeface="Meiryo UI" panose="020B0604030504040204" pitchFamily="50" charset="-128"/>
-                <a:ea typeface="Meiryo UI" panose="020B0604030504040204" pitchFamily="50" charset="-128"/>
-              </a:rPr>
-              <a:t>のサイトで</a:t>
-            </a:r>
-            <a:br>
-              <a:rPr lang="en-US" altLang="ja-JP" sz="8000" dirty="0">
-                <a:latin typeface="Meiryo UI" panose="020B0604030504040204" pitchFamily="50" charset="-128"/>
-                <a:ea typeface="Meiryo UI" panose="020B0604030504040204" pitchFamily="50" charset="-128"/>
-              </a:rPr>
-            </a:br>
-            <a:endParaRPr lang="zh-TW" altLang="en-US" sz="8000" dirty="0">
-              <a:latin typeface="Meiryo UI" panose="020B0604030504040204" pitchFamily="50" charset="-128"/>
-              <a:ea typeface="Meiryo UI" panose="020B0604030504040204" pitchFamily="50" charset="-128"/>
-            </a:endParaRPr>
-          </a:p>
-          <a:p>
-            <a:pPr algn="r">
-              <a:defRPr sz="15000"/>
-            </a:pPr>
-            <a:r>
-              <a:rPr lang="ja-JP" altLang="en-US" sz="9600" dirty="0">
-                <a:latin typeface="Meiryo UI" panose="020B0604030504040204" pitchFamily="50" charset="-128"/>
-                <a:ea typeface="Meiryo UI" panose="020B0604030504040204" pitchFamily="50" charset="-128"/>
-              </a:rPr>
-              <a:t>使える部品を見つける</a:t>
-            </a:r>
-            <a:endParaRPr lang="zh-TW" altLang="en-US" sz="9600" dirty="0">
-              <a:latin typeface="Meiryo UI" panose="020B0604030504040204" pitchFamily="50" charset="-128"/>
-              <a:ea typeface="Meiryo UI" panose="020B0604030504040204" pitchFamily="50" charset="-128"/>
-            </a:endParaRPr>
-          </a:p>
-        </p:txBody>
-      </p:sp>
-    </p:spTree>
-  </p:cSld>
-  <p:clrMapOvr>
-    <a:masterClrMapping/>
-  </p:clrMapOvr>
-  <p:transition spd="med"/>
-</p:sld>
-</file>
-
-<file path=ppt/slides/slide5.xml><?xml version="1.0" encoding="utf-8"?>
-<p:sld xmlns:a="http://schemas.openxmlformats.org/drawingml/2006/main" xmlns:r="http://schemas.openxmlformats.org/officeDocument/2006/relationships" xmlns:p="http://schemas.openxmlformats.org/presentationml/2006/main">
-  <p:cSld>
-    <p:spTree>
-      <p:nvGrpSpPr>
-        <p:cNvPr id="1" name=""/>
-        <p:cNvGrpSpPr/>
-        <p:nvPr/>
-      </p:nvGrpSpPr>
-      <p:grpSpPr>
-        <a:xfrm>
-          <a:off x="0" y="0"/>
-          <a:ext cx="0" cy="0"/>
-          <a:chOff x="0" y="0"/>
-          <a:chExt cx="0" cy="0"/>
-        </a:xfrm>
-      </p:grpSpPr>
-      <p:sp>
-        <p:nvSpPr>
-          <p:cNvPr id="179" name="程式邏輯"/>
-          <p:cNvSpPr txBox="1">
-            <a:spLocks noGrp="1"/>
-          </p:cNvSpPr>
-          <p:nvPr>
-            <p:ph type="title"/>
-          </p:nvPr>
-        </p:nvSpPr>
-        <p:spPr>
-          <a:prstGeom prst="rect">
-            <a:avLst/>
-          </a:prstGeom>
-        </p:spPr>
-        <p:txBody>
-          <a:bodyPr/>
-          <a:lstStyle>
-            <a:lvl1pPr defTabSz="338835">
-              <a:spcBef>
-                <a:spcPts val="1600"/>
-              </a:spcBef>
-              <a:defRPr sz="3480"/>
-            </a:lvl1pPr>
-          </a:lstStyle>
-          <a:p>
-            <a:r>
-              <a:rPr lang="ja-JP" altLang="en-US" dirty="0">
-                <a:latin typeface="Meiryo UI" panose="020B0604030504040204" pitchFamily="50" charset="-128"/>
-                <a:ea typeface="Meiryo UI" panose="020B0604030504040204" pitchFamily="50" charset="-128"/>
-              </a:rPr>
-              <a:t>プログラムのロジック</a:t>
-            </a:r>
-            <a:endParaRPr dirty="0">
-              <a:latin typeface="Meiryo UI" panose="020B0604030504040204" pitchFamily="50" charset="-128"/>
-              <a:ea typeface="Meiryo UI" panose="020B0604030504040204" pitchFamily="50" charset="-128"/>
-            </a:endParaRPr>
-          </a:p>
-        </p:txBody>
-      </p:sp>
-      <p:pic>
-        <p:nvPicPr>
-          <p:cNvPr id="180" name="影像" descr="影像"/>
-          <p:cNvPicPr>
-            <a:picLocks noChangeAspect="1"/>
-          </p:cNvPicPr>
-          <p:nvPr/>
-        </p:nvPicPr>
-        <p:blipFill>
-          <a:blip r:embed="rId2"/>
-          <a:stretch>
-            <a:fillRect/>
-          </a:stretch>
-        </p:blipFill>
-        <p:spPr>
-          <a:xfrm>
-            <a:off x="914400" y="4002195"/>
-            <a:ext cx="11176001" cy="3137743"/>
-          </a:xfrm>
-          <a:prstGeom prst="rect">
-            <a:avLst/>
-          </a:prstGeom>
-          <a:ln w="12700">
-            <a:miter lim="400000"/>
-          </a:ln>
-        </p:spPr>
-      </p:pic>
-    </p:spTree>
-  </p:cSld>
-  <p:clrMapOvr>
-    <a:masterClrMapping/>
-  </p:clrMapOvr>
-  <p:transition spd="med"/>
-</p:sld>
-</file>
-
-<file path=ppt/slides/slide50.xml><?xml version="1.0" encoding="utf-8"?>
 <p:sld xmlns:a="http://schemas.openxmlformats.org/drawingml/2006/main" xmlns:r="http://schemas.openxmlformats.org/officeDocument/2006/relationships" xmlns:p="http://schemas.openxmlformats.org/presentationml/2006/main">
   <p:cSld>
     <p:spTree>
@@ -14387,7 +13829,7 @@
 </p:sld>
 </file>
 
-<file path=ppt/slides/slide51.xml><?xml version="1.0" encoding="utf-8"?>
+<file path=ppt/slides/slide49.xml><?xml version="1.0" encoding="utf-8"?>
 <p:sld xmlns:a="http://schemas.openxmlformats.org/drawingml/2006/main" xmlns:r="http://schemas.openxmlformats.org/officeDocument/2006/relationships" xmlns:p="http://schemas.openxmlformats.org/presentationml/2006/main">
   <p:cSld>
     <p:spTree>
@@ -14488,7 +13930,7 @@
 </p:sld>
 </file>
 
-<file path=ppt/slides/slide52.xml><?xml version="1.0" encoding="utf-8"?>
+<file path=ppt/slides/slide5.xml><?xml version="1.0" encoding="utf-8"?>
 <p:sld xmlns:a="http://schemas.openxmlformats.org/drawingml/2006/main" xmlns:r="http://schemas.openxmlformats.org/officeDocument/2006/relationships" xmlns:p="http://schemas.openxmlformats.org/presentationml/2006/main">
   <p:cSld>
     <p:spTree>
@@ -14507,6 +13949,99 @@
       </p:grpSpPr>
       <p:sp>
         <p:nvSpPr>
+          <p:cNvPr id="179" name="程式邏輯"/>
+          <p:cNvSpPr txBox="1">
+            <a:spLocks noGrp="1"/>
+          </p:cNvSpPr>
+          <p:nvPr>
+            <p:ph type="title"/>
+          </p:nvPr>
+        </p:nvSpPr>
+        <p:spPr>
+          <a:prstGeom prst="rect">
+            <a:avLst/>
+          </a:prstGeom>
+        </p:spPr>
+        <p:txBody>
+          <a:bodyPr/>
+          <a:lstStyle>
+            <a:lvl1pPr defTabSz="338835">
+              <a:spcBef>
+                <a:spcPts val="1600"/>
+              </a:spcBef>
+              <a:defRPr sz="3480"/>
+            </a:lvl1pPr>
+          </a:lstStyle>
+          <a:p>
+            <a:r>
+              <a:rPr lang="ja-JP" altLang="en-US" dirty="0">
+                <a:latin typeface="Meiryo UI" panose="020B0604030504040204" pitchFamily="50" charset="-128"/>
+                <a:ea typeface="Meiryo UI" panose="020B0604030504040204" pitchFamily="50" charset="-128"/>
+              </a:rPr>
+              <a:t>言語のロジック</a:t>
+            </a:r>
+            <a:endParaRPr dirty="0">
+              <a:latin typeface="Meiryo UI" panose="020B0604030504040204" pitchFamily="50" charset="-128"/>
+              <a:ea typeface="Meiryo UI" panose="020B0604030504040204" pitchFamily="50" charset="-128"/>
+            </a:endParaRPr>
+          </a:p>
+        </p:txBody>
+      </p:sp>
+      <p:pic>
+        <p:nvPicPr>
+          <p:cNvPr id="180" name="影像" descr="影像"/>
+          <p:cNvPicPr>
+            <a:picLocks noChangeAspect="1"/>
+          </p:cNvPicPr>
+          <p:nvPr/>
+        </p:nvPicPr>
+        <p:blipFill>
+          <a:blip r:embed="rId2"/>
+          <a:stretch>
+            <a:fillRect/>
+          </a:stretch>
+        </p:blipFill>
+        <p:spPr>
+          <a:xfrm>
+            <a:off x="914400" y="4002195"/>
+            <a:ext cx="11176001" cy="3137743"/>
+          </a:xfrm>
+          <a:prstGeom prst="rect">
+            <a:avLst/>
+          </a:prstGeom>
+          <a:ln w="12700">
+            <a:miter lim="400000"/>
+          </a:ln>
+        </p:spPr>
+      </p:pic>
+    </p:spTree>
+  </p:cSld>
+  <p:clrMapOvr>
+    <a:masterClrMapping/>
+  </p:clrMapOvr>
+  <p:transition spd="med"/>
+</p:sld>
+</file>
+
+<file path=ppt/slides/slide50.xml><?xml version="1.0" encoding="utf-8"?>
+<p:sld xmlns:a="http://schemas.openxmlformats.org/drawingml/2006/main" xmlns:r="http://schemas.openxmlformats.org/officeDocument/2006/relationships" xmlns:p="http://schemas.openxmlformats.org/presentationml/2006/main">
+  <p:cSld>
+    <p:spTree>
+      <p:nvGrpSpPr>
+        <p:cNvPr id="1" name=""/>
+        <p:cNvGrpSpPr/>
+        <p:nvPr/>
+      </p:nvGrpSpPr>
+      <p:grpSpPr>
+        <a:xfrm>
+          <a:off x="0" y="0"/>
+          <a:ext cx="0" cy="0"/>
+          <a:chOff x="0" y="0"/>
+          <a:chExt cx="0" cy="0"/>
+        </a:xfrm>
+      </p:grpSpPr>
+      <p:sp>
+        <p:nvSpPr>
           <p:cNvPr id="396" name="觀察畫面的變化(template.html)"/>
           <p:cNvSpPr txBox="1">
             <a:spLocks noGrp="1"/>
@@ -14597,7 +14132,7 @@
 </p:sld>
 </file>
 
-<file path=ppt/slides/slide53.xml><?xml version="1.0" encoding="utf-8"?>
+<file path=ppt/slides/slide51.xml><?xml version="1.0" encoding="utf-8"?>
 <p:sld xmlns:a="http://schemas.openxmlformats.org/drawingml/2006/main" xmlns:r="http://schemas.openxmlformats.org/officeDocument/2006/relationships" xmlns:p="http://schemas.openxmlformats.org/presentationml/2006/main">
   <p:cSld>
     <p:spTree>
@@ -14698,7 +14233,7 @@
 </p:sld>
 </file>
 
-<file path=ppt/slides/slide54.xml><?xml version="1.0" encoding="utf-8"?>
+<file path=ppt/slides/slide52.xml><?xml version="1.0" encoding="utf-8"?>
 <p:sld xmlns:a="http://schemas.openxmlformats.org/drawingml/2006/main" xmlns:r="http://schemas.openxmlformats.org/officeDocument/2006/relationships" xmlns:p="http://schemas.openxmlformats.org/presentationml/2006/main">
   <p:cSld>
     <p:spTree>
@@ -14809,7 +14344,7 @@
           </a:ln>
           <a:extLst>
             <a:ext uri="{C572A759-6A51-4108-AA02-DFA0A04FC94B}">
-              <ma14:wrappingTextBoxFlag xmlns="" xmlns:m="http://schemas.openxmlformats.org/officeDocument/2006/math" xmlns:a14="http://schemas.microsoft.com/office/drawing/2010/main" xmlns:ma14="http://schemas.microsoft.com/office/mac/drawingml/2011/main" val="1"/>
+              <ma14:wrappingTextBoxFlag xmlns:ma14="http://schemas.microsoft.com/office/mac/drawingml/2011/main" xmlns:a14="http://schemas.microsoft.com/office/drawing/2010/main" xmlns:m="http://schemas.openxmlformats.org/officeDocument/2006/math" xmlns="" val="1"/>
             </a:ext>
           </a:extLst>
         </p:spPr>
@@ -14856,7 +14391,7 @@
           </a:ln>
           <a:extLst>
             <a:ext uri="{C572A759-6A51-4108-AA02-DFA0A04FC94B}">
-              <ma14:wrappingTextBoxFlag xmlns="" xmlns:m="http://schemas.openxmlformats.org/officeDocument/2006/math" xmlns:a14="http://schemas.microsoft.com/office/drawing/2010/main" xmlns:ma14="http://schemas.microsoft.com/office/mac/drawingml/2011/main" val="1"/>
+              <ma14:wrappingTextBoxFlag xmlns:ma14="http://schemas.microsoft.com/office/mac/drawingml/2011/main" xmlns:a14="http://schemas.microsoft.com/office/drawing/2010/main" xmlns:m="http://schemas.openxmlformats.org/officeDocument/2006/math" xmlns="" val="1"/>
             </a:ext>
           </a:extLst>
         </p:spPr>
@@ -14893,7 +14428,7 @@
 </p:sld>
 </file>
 
-<file path=ppt/slides/slide55.xml><?xml version="1.0" encoding="utf-8"?>
+<file path=ppt/slides/slide53.xml><?xml version="1.0" encoding="utf-8"?>
 <p:sld xmlns:a="http://schemas.openxmlformats.org/drawingml/2006/main" xmlns:r="http://schemas.openxmlformats.org/officeDocument/2006/relationships" xmlns:p="http://schemas.openxmlformats.org/presentationml/2006/main">
   <p:cSld>
     <p:spTree>
@@ -15042,7 +14577,7 @@
 </p:sld>
 </file>
 
-<file path=ppt/slides/slide56.xml><?xml version="1.0" encoding="utf-8"?>
+<file path=ppt/slides/slide54.xml><?xml version="1.0" encoding="utf-8"?>
 <p:sld xmlns:a="http://schemas.openxmlformats.org/drawingml/2006/main" xmlns:r="http://schemas.openxmlformats.org/officeDocument/2006/relationships" xmlns:p="http://schemas.openxmlformats.org/presentationml/2006/main">
   <p:cSld>
     <p:spTree>
@@ -15143,7 +14678,7 @@
 </p:sld>
 </file>
 
-<file path=ppt/slides/slide57.xml><?xml version="1.0" encoding="utf-8"?>
+<file path=ppt/slides/slide55.xml><?xml version="1.0" encoding="utf-8"?>
 <p:sld xmlns:a="http://schemas.openxmlformats.org/drawingml/2006/main" xmlns:r="http://schemas.openxmlformats.org/officeDocument/2006/relationships" xmlns:p="http://schemas.openxmlformats.org/presentationml/2006/main">
   <p:cSld>
     <p:spTree>
@@ -15203,7 +14738,7 @@
 </p:sld>
 </file>
 
-<file path=ppt/slides/slide58.xml><?xml version="1.0" encoding="utf-8"?>
+<file path=ppt/slides/slide56.xml><?xml version="1.0" encoding="utf-8"?>
 <p:sld xmlns:a="http://schemas.openxmlformats.org/drawingml/2006/main" xmlns:r="http://schemas.openxmlformats.org/officeDocument/2006/relationships" xmlns:p="http://schemas.openxmlformats.org/presentationml/2006/main">
   <p:cSld>
     <p:spTree>
@@ -15274,7 +14809,7 @@
           </a:ln>
           <a:extLst>
             <a:ext uri="{C572A759-6A51-4108-AA02-DFA0A04FC94B}">
-              <ma14:wrappingTextBoxFlag xmlns="" xmlns:m="http://schemas.openxmlformats.org/officeDocument/2006/math" xmlns:a14="http://schemas.microsoft.com/office/drawing/2010/main" xmlns:ma14="http://schemas.microsoft.com/office/mac/drawingml/2011/main" val="1"/>
+              <ma14:wrappingTextBoxFlag xmlns:ma14="http://schemas.microsoft.com/office/mac/drawingml/2011/main" xmlns:a14="http://schemas.microsoft.com/office/drawing/2010/main" xmlns:m="http://schemas.openxmlformats.org/officeDocument/2006/math" xmlns="" val="1"/>
             </a:ext>
           </a:extLst>
         </p:spPr>
@@ -15592,7 +15127,7 @@
                 <a:latin typeface="Meiryo UI" panose="020B0604030504040204" pitchFamily="50" charset="-128"/>
                 <a:ea typeface="Meiryo UI" panose="020B0604030504040204" pitchFamily="50" charset="-128"/>
               </a:rPr>
-              <a:t>プログラムのロジック</a:t>
+              <a:t>言語のロジック</a:t>
             </a:r>
             <a:endParaRPr dirty="0"/>
           </a:p>
@@ -15614,8 +15149,8 @@
         </p:blipFill>
         <p:spPr>
           <a:xfrm>
-            <a:off x="4926059" y="7272742"/>
-            <a:ext cx="7814329" cy="215901"/>
+            <a:off x="6851737" y="6651321"/>
+            <a:ext cx="5951281" cy="248599"/>
           </a:xfrm>
           <a:prstGeom prst="rect">
             <a:avLst/>
@@ -15649,7 +15184,7 @@
           </a:ln>
           <a:extLst>
             <a:ext uri="{C572A759-6A51-4108-AA02-DFA0A04FC94B}">
-              <ma14:wrappingTextBoxFlag xmlns="" xmlns:m="http://schemas.openxmlformats.org/officeDocument/2006/math" xmlns:a14="http://schemas.microsoft.com/office/drawing/2010/main" xmlns:ma14="http://schemas.microsoft.com/office/mac/drawingml/2011/main" val="1"/>
+              <ma14:wrappingTextBoxFlag xmlns:ma14="http://schemas.microsoft.com/office/mac/drawingml/2011/main" xmlns:a14="http://schemas.microsoft.com/office/drawing/2010/main" xmlns:m="http://schemas.openxmlformats.org/officeDocument/2006/math" xmlns="" val="1"/>
             </a:ext>
           </a:extLst>
         </p:spPr>
@@ -15912,11 +15447,18 @@
           <a:p>
             <a:pPr hangingPunct="1"/>
             <a:r>
+              <a:rPr lang="en-US" altLang="ja-JP" dirty="0">
+                <a:latin typeface="Meiryo UI" panose="020B0604030504040204" pitchFamily="50" charset="-128"/>
+                <a:ea typeface="Meiryo UI" panose="020B0604030504040204" pitchFamily="50" charset="-128"/>
+              </a:rPr>
+              <a:t>Web</a:t>
+            </a:r>
+            <a:r>
               <a:rPr lang="ja-JP" altLang="en-US" dirty="0">
                 <a:latin typeface="Meiryo UI" panose="020B0604030504040204" pitchFamily="50" charset="-128"/>
                 <a:ea typeface="Meiryo UI" panose="020B0604030504040204" pitchFamily="50" charset="-128"/>
               </a:rPr>
-              <a:t>プログラミングをする上で大切なこと</a:t>
+              <a:t>開発で大切なこと</a:t>
             </a:r>
             <a:endParaRPr lang="zh-TW" altLang="en-US" dirty="0">
               <a:latin typeface="Meiryo UI" panose="020B0604030504040204" pitchFamily="50" charset="-128"/>
@@ -16018,7 +15560,7 @@
           </a:ln>
           <a:extLst>
             <a:ext uri="{C572A759-6A51-4108-AA02-DFA0A04FC94B}">
-              <ma14:wrappingTextBoxFlag xmlns="" xmlns:m="http://schemas.openxmlformats.org/officeDocument/2006/math" xmlns:a14="http://schemas.microsoft.com/office/drawing/2010/main" xmlns:ma14="http://schemas.microsoft.com/office/mac/drawingml/2011/main" val="1"/>
+              <ma14:wrappingTextBoxFlag xmlns:ma14="http://schemas.microsoft.com/office/mac/drawingml/2011/main" xmlns:a14="http://schemas.microsoft.com/office/drawing/2010/main" xmlns:m="http://schemas.openxmlformats.org/officeDocument/2006/math" xmlns="" val="1"/>
             </a:ext>
           </a:extLst>
         </p:spPr>
@@ -16281,11 +15823,18 @@
           <a:p>
             <a:pPr hangingPunct="1"/>
             <a:r>
+              <a:rPr lang="en-US" altLang="ja-JP" dirty="0">
+                <a:latin typeface="Meiryo UI" panose="020B0604030504040204" pitchFamily="50" charset="-128"/>
+                <a:ea typeface="Meiryo UI" panose="020B0604030504040204" pitchFamily="50" charset="-128"/>
+              </a:rPr>
+              <a:t>Web</a:t>
+            </a:r>
+            <a:r>
               <a:rPr lang="ja-JP" altLang="en-US" dirty="0">
                 <a:latin typeface="Meiryo UI" panose="020B0604030504040204" pitchFamily="50" charset="-128"/>
                 <a:ea typeface="Meiryo UI" panose="020B0604030504040204" pitchFamily="50" charset="-128"/>
               </a:rPr>
-              <a:t>プログラミングをする上で大切なこと</a:t>
+              <a:t>開発で大切なこと</a:t>
             </a:r>
             <a:endParaRPr lang="zh-TW" altLang="en-US" dirty="0">
               <a:latin typeface="Meiryo UI" panose="020B0604030504040204" pitchFamily="50" charset="-128"/>
@@ -16590,7 +16139,7 @@
           </a:ln>
           <a:extLst>
             <a:ext uri="{C572A759-6A51-4108-AA02-DFA0A04FC94B}">
-              <ma14:wrappingTextBoxFlag xmlns="" xmlns:m="http://schemas.openxmlformats.org/officeDocument/2006/math" xmlns:a14="http://schemas.microsoft.com/office/drawing/2010/main" xmlns:ma14="http://schemas.microsoft.com/office/mac/drawingml/2011/main" val="1"/>
+              <ma14:wrappingTextBoxFlag xmlns:ma14="http://schemas.microsoft.com/office/mac/drawingml/2011/main" xmlns:a14="http://schemas.microsoft.com/office/drawing/2010/main" xmlns:m="http://schemas.openxmlformats.org/officeDocument/2006/math" xmlns="" val="1"/>
             </a:ext>
           </a:extLst>
         </p:spPr>
@@ -16853,11 +16402,18 @@
           <a:p>
             <a:pPr hangingPunct="1"/>
             <a:r>
+              <a:rPr lang="en-US" altLang="ja-JP" dirty="0">
+                <a:latin typeface="Meiryo UI" panose="020B0604030504040204" pitchFamily="50" charset="-128"/>
+                <a:ea typeface="Meiryo UI" panose="020B0604030504040204" pitchFamily="50" charset="-128"/>
+              </a:rPr>
+              <a:t>Web</a:t>
+            </a:r>
+            <a:r>
               <a:rPr lang="ja-JP" altLang="en-US" dirty="0">
                 <a:latin typeface="Meiryo UI" panose="020B0604030504040204" pitchFamily="50" charset="-128"/>
                 <a:ea typeface="Meiryo UI" panose="020B0604030504040204" pitchFamily="50" charset="-128"/>
               </a:rPr>
-              <a:t>プログラミングをする上で大切なこと</a:t>
+              <a:t>開発で大切なこと</a:t>
             </a:r>
             <a:endParaRPr lang="zh-TW" altLang="en-US" dirty="0">
               <a:latin typeface="Meiryo UI" panose="020B0604030504040204" pitchFamily="50" charset="-128"/>
@@ -16888,7 +16444,7 @@
         </p:blipFill>
         <p:spPr>
           <a:xfrm>
-            <a:off x="6926634" y="7299636"/>
+            <a:off x="6939160" y="6685861"/>
             <a:ext cx="5760000" cy="215901"/>
           </a:xfrm>
           <a:prstGeom prst="rect">

</xml_diff>